<commit_message>
Added bar chart to compare models
</commit_message>
<xml_diff>
--- a/P5_02_Presentation.pptx
+++ b/P5_02_Presentation.pptx
@@ -15406,21 +15406,23 @@
               </a:rPr>
               <a:t>Inertia minimization algorithm  </a:t>
             </a:r>
+          </a:p>
+          <a:p>
+            <a:pPr marL="628650" lvl="1" indent="0">
+              <a:lnSpc>
+                <a:spcPct val="200000"/>
+              </a:lnSpc>
+              <a:buNone/>
+            </a:pPr>
             <a:r>
-              <a:rPr lang="en-US" sz="1400" b="1" dirty="0" err="1">
+              <a:rPr lang="en-US" sz="1400" b="1" dirty="0">
                 <a:solidFill>
                   <a:schemeClr val="tx1"/>
                 </a:solidFill>
                 <a:sym typeface="Wingdings" panose="05000000000000000000" pitchFamily="2" charset="2"/>
               </a:rPr>
-              <a:t>Kmeans</a:t>
+              <a:t>	K-means</a:t>
             </a:r>
-            <a:endParaRPr lang="en-US" sz="1400" b="1" dirty="0">
-              <a:solidFill>
-                <a:schemeClr val="tx1"/>
-              </a:solidFill>
-              <a:sym typeface="Wingdings" panose="05000000000000000000" pitchFamily="2" charset="2"/>
-            </a:endParaRPr>
           </a:p>
           <a:p>
             <a:pPr lvl="1">
@@ -15720,7 +15722,7 @@
                   <a:schemeClr val="tx1"/>
                 </a:solidFill>
               </a:rPr>
-              <a:t>of the 3 models using an optimized search algorithm (Bayesian Search)</a:t>
+              <a:t>of the 2 models using manual Grid search</a:t>
             </a:r>
           </a:p>
           <a:p>
@@ -15747,7 +15749,23 @@
                   <a:schemeClr val="tx1"/>
                 </a:solidFill>
               </a:rPr>
-              <a:t>Compute ROC AUC (test) score on the 3 models</a:t>
+              <a:t>Compute </a:t>
+            </a:r>
+            <a:r>
+              <a:rPr lang="en-US" sz="1400" b="1" dirty="0">
+                <a:solidFill>
+                  <a:schemeClr val="tx1"/>
+                </a:solidFill>
+              </a:rPr>
+              <a:t>Silhouette score and Stability index </a:t>
+            </a:r>
+            <a:r>
+              <a:rPr lang="en-US" sz="1400" dirty="0">
+                <a:solidFill>
+                  <a:schemeClr val="tx1"/>
+                </a:solidFill>
+              </a:rPr>
+              <a:t>on the 2 models with the best hyperparameters</a:t>
             </a:r>
           </a:p>
           <a:p>
@@ -15780,7 +15798,7 @@
                 </a:solidFill>
                 <a:sym typeface="Wingdings" panose="05000000000000000000" pitchFamily="2" charset="2"/>
               </a:rPr>
-              <a:t> Ridge Classifier has the best performance and will be chosen for our model</a:t>
+              <a:t> DBSCAN has the best performance and will be chosen as our model</a:t>
             </a:r>
             <a:endParaRPr lang="en-US" sz="1400" b="1" dirty="0">
               <a:solidFill>
@@ -15847,22 +15865,14 @@
           <p:nvPr/>
         </p:nvPicPr>
         <p:blipFill>
-          <a:blip r:embed="rId3">
-            <a:extLst>
-              <a:ext uri="{28A0092B-C50C-407E-A947-70E740481C1C}">
-                <a14:useLocalDpi xmlns:a14="http://schemas.microsoft.com/office/drawing/2010/main" val="0"/>
-              </a:ext>
-            </a:extLst>
-          </a:blip>
+          <a:blip r:embed="rId3"/>
           <a:srcRect/>
-          <a:stretch>
-            <a:fillRect/>
-          </a:stretch>
+          <a:stretch/>
         </p:blipFill>
         <p:spPr bwMode="auto">
           <a:xfrm>
-            <a:off x="4553602" y="602671"/>
-            <a:ext cx="4594514" cy="3938155"/>
+            <a:off x="4553602" y="534484"/>
+            <a:ext cx="4590398" cy="4091664"/>
           </a:xfrm>
           <a:prstGeom prst="rect">
             <a:avLst/>
@@ -15951,16 +15961,53 @@
                   <a:schemeClr val="tx1"/>
                 </a:solidFill>
               </a:rPr>
-              <a:t>To improve our model further :</a:t>
+              <a:t>Our model has a </a:t>
             </a:r>
-          </a:p>
-          <a:p>
-            <a:pPr lvl="1">
+            <a:r>
+              <a:rPr lang="en-US" sz="1400" b="1" dirty="0">
+                <a:solidFill>
+                  <a:schemeClr val="tx1"/>
+                </a:solidFill>
+              </a:rPr>
+              <a:t>good Silhouette score at 0,597 </a:t>
+            </a:r>
+            <a:r>
+              <a:rPr lang="en-US" sz="1400" dirty="0">
+                <a:solidFill>
+                  <a:schemeClr val="tx1"/>
+                </a:solidFill>
+              </a:rPr>
+              <a:t>on the whole dataset.</a:t>
+            </a:r>
+          </a:p>
+          <a:p>
+            <a:pPr>
               <a:lnSpc>
                 <a:spcPct val="200000"/>
               </a:lnSpc>
-              <a:buFont typeface="Wingdings" panose="05000000000000000000" pitchFamily="2" charset="2"/>
-              <a:buChar char="Ø"/>
+            </a:pPr>
+            <a:r>
+              <a:rPr lang="en-US" sz="1400" b="1" dirty="0">
+                <a:solidFill>
+                  <a:schemeClr val="tx1"/>
+                </a:solidFill>
+              </a:rPr>
+              <a:t>Stability score = 1</a:t>
+            </a:r>
+            <a:r>
+              <a:rPr lang="en-US" sz="1400" dirty="0">
+                <a:solidFill>
+                  <a:schemeClr val="tx1"/>
+                </a:solidFill>
+              </a:rPr>
+              <a:t>.</a:t>
+            </a:r>
+          </a:p>
+          <a:p>
+            <a:pPr>
+              <a:lnSpc>
+                <a:spcPct val="200000"/>
+              </a:lnSpc>
             </a:pPr>
             <a:r>
               <a:rPr lang="en-US" sz="1400" dirty="0">
@@ -15968,7 +16015,7 @@
                   <a:schemeClr val="tx1"/>
                 </a:solidFill>
               </a:rPr>
-              <a:t>Selection of the most efficient scaler (</a:t>
+              <a:t>It separates the dataset in </a:t>
             </a:r>
             <a:r>
               <a:rPr lang="en-US" sz="1400" b="1" dirty="0">
@@ -15976,24 +16023,14 @@
                   <a:schemeClr val="tx1"/>
                 </a:solidFill>
               </a:rPr>
-              <a:t>Standard Scaler</a:t>
+              <a:t>6 clusters.</a:t>
             </a:r>
-            <a:r>
-              <a:rPr lang="en-US" sz="1400" dirty="0">
-                <a:solidFill>
-                  <a:schemeClr val="tx1"/>
-                </a:solidFill>
-              </a:rPr>
-              <a:t>)</a:t>
-            </a:r>
-          </a:p>
-          <a:p>
-            <a:pPr lvl="1">
+          </a:p>
+          <a:p>
+            <a:pPr>
               <a:lnSpc>
                 <a:spcPct val="200000"/>
               </a:lnSpc>
-              <a:buFont typeface="Wingdings" panose="05000000000000000000" pitchFamily="2" charset="2"/>
-              <a:buChar char="Ø"/>
             </a:pPr>
             <a:r>
               <a:rPr lang="en-US" sz="1400" dirty="0">
@@ -16001,7 +16038,7 @@
                   <a:schemeClr val="tx1"/>
                 </a:solidFill>
               </a:rPr>
-              <a:t> Identification of the best feature selection method (</a:t>
+              <a:t>There is an </a:t>
             </a:r>
             <a:r>
               <a:rPr lang="en-US" sz="1400" b="1" dirty="0">
@@ -16009,96 +16046,23 @@
                   <a:schemeClr val="tx1"/>
                 </a:solidFill>
               </a:rPr>
-              <a:t>Boruta Algorithm</a:t>
+              <a:t>unequal distribution of the samples in those clusters</a:t>
             </a:r>
-            <a:r>
-              <a:rPr lang="en-US" sz="1400" dirty="0">
-                <a:solidFill>
-                  <a:schemeClr val="tx1"/>
-                </a:solidFill>
-              </a:rPr>
-              <a:t>)</a:t>
-            </a:r>
-          </a:p>
-          <a:p>
-            <a:pPr lvl="1">
+          </a:p>
+          <a:p>
+            <a:pPr>
               <a:lnSpc>
                 <a:spcPct val="200000"/>
               </a:lnSpc>
-              <a:buFont typeface="Wingdings" panose="05000000000000000000" pitchFamily="2" charset="2"/>
-              <a:buChar char="Ø"/>
             </a:pPr>
             <a:r>
-              <a:rPr lang="en-US" sz="1400" dirty="0">
+              <a:rPr lang="en-US" sz="1400" b="1" dirty="0">
                 <a:solidFill>
                   <a:schemeClr val="tx1"/>
                 </a:solidFill>
               </a:rPr>
-              <a:t>Selection of the best categorical variable encoding methods (</a:t>
+              <a:t>Cluster 0 (in blue) predominant.</a:t>
             </a:r>
-            <a:r>
-              <a:rPr lang="en-US" sz="1400" b="1" dirty="0">
-                <a:solidFill>
-                  <a:schemeClr val="tx1"/>
-                </a:solidFill>
-              </a:rPr>
-              <a:t>Mixed Encoding</a:t>
-            </a:r>
-            <a:r>
-              <a:rPr lang="en-US" sz="1400" dirty="0">
-                <a:solidFill>
-                  <a:schemeClr val="tx1"/>
-                </a:solidFill>
-              </a:rPr>
-              <a:t>)</a:t>
-            </a:r>
-          </a:p>
-          <a:p>
-            <a:pPr lvl="1">
-              <a:lnSpc>
-                <a:spcPct val="200000"/>
-              </a:lnSpc>
-              <a:buFont typeface="Wingdings" panose="05000000000000000000" pitchFamily="2" charset="2"/>
-              <a:buChar char="Ø"/>
-            </a:pPr>
-            <a:r>
-              <a:rPr lang="en-US" sz="1400" dirty="0">
-                <a:solidFill>
-                  <a:schemeClr val="tx1"/>
-                </a:solidFill>
-              </a:rPr>
-              <a:t>Applied the most performant oversampling algorithm and ratio  (</a:t>
-            </a:r>
-            <a:r>
-              <a:rPr lang="en-US" sz="1400" b="1" dirty="0">
-                <a:solidFill>
-                  <a:schemeClr val="tx1"/>
-                </a:solidFill>
-              </a:rPr>
-              <a:t>ADASYN</a:t>
-            </a:r>
-            <a:r>
-              <a:rPr lang="en-US" sz="1400" dirty="0">
-                <a:solidFill>
-                  <a:schemeClr val="tx1"/>
-                </a:solidFill>
-              </a:rPr>
-              <a:t> ratio =1)</a:t>
-            </a:r>
-          </a:p>
-          <a:p>
-            <a:pPr lvl="1">
-              <a:lnSpc>
-                <a:spcPct val="200000"/>
-              </a:lnSpc>
-              <a:buFont typeface="Wingdings" panose="05000000000000000000" pitchFamily="2" charset="2"/>
-              <a:buChar char="Ø"/>
-            </a:pPr>
-            <a:endParaRPr lang="en-US" sz="1400" dirty="0">
-              <a:solidFill>
-                <a:schemeClr val="tx1"/>
-              </a:solidFill>
-            </a:endParaRPr>
           </a:p>
         </p:txBody>
       </p:sp>
@@ -16134,7 +16098,7 @@
                   <a:schemeClr val="tx1"/>
                 </a:solidFill>
               </a:rPr>
-              <a:t>Optimization of the preprocessing pipeline</a:t>
+              <a:t>Final Model Performance</a:t>
             </a:r>
             <a:endParaRPr lang="en-US" b="1" dirty="0">
               <a:solidFill>
@@ -16159,22 +16123,14 @@
           <p:nvPr/>
         </p:nvPicPr>
         <p:blipFill>
-          <a:blip r:embed="rId3">
-            <a:extLst>
-              <a:ext uri="{28A0092B-C50C-407E-A947-70E740481C1C}">
-                <a14:useLocalDpi xmlns:a14="http://schemas.microsoft.com/office/drawing/2010/main" val="0"/>
-              </a:ext>
-            </a:extLst>
-          </a:blip>
+          <a:blip r:embed="rId3"/>
           <a:srcRect/>
-          <a:stretch>
-            <a:fillRect/>
-          </a:stretch>
+          <a:stretch/>
         </p:blipFill>
         <p:spPr bwMode="auto">
           <a:xfrm>
-            <a:off x="5634129" y="0"/>
-            <a:ext cx="2506662" cy="2571750"/>
+            <a:off x="4563146" y="878971"/>
+            <a:ext cx="4580854" cy="3385557"/>
           </a:xfrm>
           <a:prstGeom prst="rect">
             <a:avLst/>
@@ -16196,119 +16152,6 @@
           </a:extLst>
         </p:spPr>
       </p:pic>
-      <p:pic>
-        <p:nvPicPr>
-          <p:cNvPr id="5" name="Picture 4">
-            <a:extLst>
-              <a:ext uri="{FF2B5EF4-FFF2-40B4-BE49-F238E27FC236}">
-                <a16:creationId xmlns:a16="http://schemas.microsoft.com/office/drawing/2014/main" id="{1F3583C4-94B8-22EC-D789-953E88E3DAC9}"/>
-              </a:ext>
-            </a:extLst>
-          </p:cNvPr>
-          <p:cNvPicPr>
-            <a:picLocks noChangeAspect="1"/>
-          </p:cNvPicPr>
-          <p:nvPr/>
-        </p:nvPicPr>
-        <p:blipFill>
-          <a:blip r:embed="rId4"/>
-          <a:stretch>
-            <a:fillRect/>
-          </a:stretch>
-        </p:blipFill>
-        <p:spPr>
-          <a:xfrm>
-            <a:off x="5025777" y="2632999"/>
-            <a:ext cx="3723367" cy="2429226"/>
-          </a:xfrm>
-          <a:prstGeom prst="rect">
-            <a:avLst/>
-          </a:prstGeom>
-          <a:ln>
-            <a:solidFill>
-              <a:schemeClr val="tx1"/>
-            </a:solidFill>
-          </a:ln>
-        </p:spPr>
-      </p:pic>
-      <p:sp>
-        <p:nvSpPr>
-          <p:cNvPr id="2" name="TextBox 1">
-            <a:extLst>
-              <a:ext uri="{FF2B5EF4-FFF2-40B4-BE49-F238E27FC236}">
-                <a16:creationId xmlns:a16="http://schemas.microsoft.com/office/drawing/2014/main" id="{A52A5FFD-BF6E-16BC-7FC6-9ADB0734DE47}"/>
-              </a:ext>
-            </a:extLst>
-          </p:cNvPr>
-          <p:cNvSpPr txBox="1"/>
-          <p:nvPr/>
-        </p:nvSpPr>
-        <p:spPr>
-          <a:xfrm>
-            <a:off x="7460672" y="4121727"/>
-            <a:ext cx="1738745" cy="261610"/>
-          </a:xfrm>
-          <a:prstGeom prst="rect">
-            <a:avLst/>
-          </a:prstGeom>
-          <a:noFill/>
-        </p:spPr>
-        <p:txBody>
-          <a:bodyPr wrap="square" rtlCol="0">
-            <a:spAutoFit/>
-          </a:bodyPr>
-          <a:lstStyle/>
-          <a:p>
-            <a:r>
-              <a:rPr lang="en-US" sz="1100" dirty="0">
-                <a:solidFill>
-                  <a:srgbClr val="FF0000"/>
-                </a:solidFill>
-              </a:rPr>
-              <a:t>= Boruta Selector</a:t>
-            </a:r>
-          </a:p>
-        </p:txBody>
-      </p:sp>
-      <p:sp>
-        <p:nvSpPr>
-          <p:cNvPr id="6" name="TextBox 5">
-            <a:extLst>
-              <a:ext uri="{FF2B5EF4-FFF2-40B4-BE49-F238E27FC236}">
-                <a16:creationId xmlns:a16="http://schemas.microsoft.com/office/drawing/2014/main" id="{BE4F9223-0A70-C42F-5A98-D508B94C3084}"/>
-              </a:ext>
-            </a:extLst>
-          </p:cNvPr>
-          <p:cNvSpPr txBox="1"/>
-          <p:nvPr/>
-        </p:nvSpPr>
-        <p:spPr>
-          <a:xfrm>
-            <a:off x="7460671" y="3586002"/>
-            <a:ext cx="1738745" cy="261610"/>
-          </a:xfrm>
-          <a:prstGeom prst="rect">
-            <a:avLst/>
-          </a:prstGeom>
-          <a:noFill/>
-        </p:spPr>
-        <p:txBody>
-          <a:bodyPr wrap="square" rtlCol="0">
-            <a:spAutoFit/>
-          </a:bodyPr>
-          <a:lstStyle/>
-          <a:p>
-            <a:r>
-              <a:rPr lang="en-US" sz="1100" dirty="0">
-                <a:solidFill>
-                  <a:srgbClr val="FF0000"/>
-                </a:solidFill>
-              </a:rPr>
-              <a:t>= Median Imputer</a:t>
-            </a:r>
-          </a:p>
-        </p:txBody>
-      </p:sp>
     </p:spTree>
     <p:extLst>
       <p:ext uri="{BB962C8B-B14F-4D97-AF65-F5344CB8AC3E}">
@@ -21065,7 +20908,23 @@
                   <a:schemeClr val="tx1"/>
                 </a:solidFill>
               </a:rPr>
-              <a:t>Feature Selection using Variance Threshold (0,04)</a:t>
+              <a:t>Feature Selection using </a:t>
+            </a:r>
+            <a:r>
+              <a:rPr lang="en-US" sz="1600" b="1" dirty="0">
+                <a:solidFill>
+                  <a:schemeClr val="tx1"/>
+                </a:solidFill>
+              </a:rPr>
+              <a:t>Variance Threshold </a:t>
+            </a:r>
+            <a:r>
+              <a:rPr lang="en-US" sz="1600" dirty="0">
+                <a:solidFill>
+                  <a:schemeClr val="tx1"/>
+                </a:solidFill>
+              </a:rPr>
+              <a:t>(0,04)</a:t>
             </a:r>
           </a:p>
           <a:p>
@@ -21090,7 +20949,23 @@
                   <a:schemeClr val="tx1"/>
                 </a:solidFill>
               </a:rPr>
-              <a:t>Feature Selection using Correlation Selector (0,8)</a:t>
+              <a:t>Feature Selection using custom </a:t>
+            </a:r>
+            <a:r>
+              <a:rPr lang="en-US" sz="1600" b="1" dirty="0">
+                <a:solidFill>
+                  <a:schemeClr val="tx1"/>
+                </a:solidFill>
+              </a:rPr>
+              <a:t>Correlation Selector</a:t>
+            </a:r>
+            <a:r>
+              <a:rPr lang="en-US" sz="1600" dirty="0">
+                <a:solidFill>
+                  <a:schemeClr val="tx1"/>
+                </a:solidFill>
+              </a:rPr>
+              <a:t> (0,8) with feature names out</a:t>
             </a:r>
           </a:p>
           <a:p>
@@ -21118,14 +20993,14 @@
               <a:t>Scaling using </a:t>
             </a:r>
             <a:r>
-              <a:rPr lang="en-US" sz="1600" dirty="0" err="1">
+              <a:rPr lang="en-US" sz="1600" b="1" dirty="0" err="1">
                 <a:solidFill>
                   <a:schemeClr val="tx1"/>
                 </a:solidFill>
               </a:rPr>
               <a:t>MinMaxScaler</a:t>
             </a:r>
-            <a:endParaRPr lang="en-US" sz="1600" dirty="0">
+            <a:endParaRPr lang="en-US" sz="1600" b="1" dirty="0">
               <a:solidFill>
                 <a:schemeClr val="tx1"/>
               </a:solidFill>

</xml_diff>

<commit_message>
Finalized notebook and presentation
</commit_message>
<xml_diff>
--- a/P5_02_Presentation.pptx
+++ b/P5_02_Presentation.pptx
@@ -20,9 +20,9 @@
     <p:sldId id="311" r:id="rId11"/>
     <p:sldId id="301" r:id="rId12"/>
     <p:sldId id="338" r:id="rId13"/>
-    <p:sldId id="335" r:id="rId14"/>
-    <p:sldId id="348" r:id="rId15"/>
-    <p:sldId id="313" r:id="rId16"/>
+    <p:sldId id="313" r:id="rId14"/>
+    <p:sldId id="335" r:id="rId15"/>
+    <p:sldId id="348" r:id="rId16"/>
     <p:sldId id="331" r:id="rId17"/>
     <p:sldId id="328" r:id="rId18"/>
     <p:sldId id="317" r:id="rId19"/>
@@ -15731,7 +15731,7 @@
                 <a:spcPct val="200000"/>
               </a:lnSpc>
             </a:pPr>
-            <a:endParaRPr lang="en-US" sz="1400" dirty="0">
+            <a:endParaRPr lang="en-US" sz="800" dirty="0">
               <a:solidFill>
                 <a:schemeClr val="tx1"/>
               </a:solidFill>
@@ -15769,11 +15769,22 @@
             </a:r>
           </a:p>
           <a:p>
-            <a:pPr marL="171450" indent="0">
+            <a:pPr>
               <a:lnSpc>
                 <a:spcPct val="200000"/>
               </a:lnSpc>
-              <a:buNone/>
+            </a:pPr>
+            <a:endParaRPr lang="en-US" sz="800" dirty="0">
+              <a:solidFill>
+                <a:schemeClr val="tx1"/>
+              </a:solidFill>
+            </a:endParaRPr>
+          </a:p>
+          <a:p>
+            <a:pPr>
+              <a:lnSpc>
+                <a:spcPct val="200000"/>
+              </a:lnSpc>
             </a:pPr>
             <a:r>
               <a:rPr lang="en-US" sz="1400" dirty="0">
@@ -15781,8 +15792,44 @@
                   <a:schemeClr val="tx1"/>
                 </a:solidFill>
               </a:rPr>
-              <a:t> </a:t>
+              <a:t>Investigate the </a:t>
             </a:r>
+            <a:r>
+              <a:rPr lang="en-US" sz="1400" b="1" dirty="0">
+                <a:solidFill>
+                  <a:schemeClr val="tx1"/>
+                </a:solidFill>
+              </a:rPr>
+              <a:t>shape</a:t>
+            </a:r>
+            <a:r>
+              <a:rPr lang="en-US" sz="1400" dirty="0">
+                <a:solidFill>
+                  <a:schemeClr val="tx1"/>
+                </a:solidFill>
+              </a:rPr>
+              <a:t> of both models using </a:t>
+            </a:r>
+            <a:r>
+              <a:rPr lang="en-US" sz="1400" b="1" dirty="0">
+                <a:solidFill>
+                  <a:schemeClr val="tx1"/>
+                </a:solidFill>
+              </a:rPr>
+              <a:t>PCA visualization</a:t>
+            </a:r>
+          </a:p>
+          <a:p>
+            <a:pPr>
+              <a:lnSpc>
+                <a:spcPct val="200000"/>
+              </a:lnSpc>
+            </a:pPr>
+            <a:endParaRPr lang="en-US" sz="800" dirty="0">
+              <a:solidFill>
+                <a:schemeClr val="tx1"/>
+              </a:solidFill>
+            </a:endParaRPr>
           </a:p>
           <a:p>
             <a:pPr marL="171450" indent="0">
@@ -15871,8 +15918,8 @@
         </p:blipFill>
         <p:spPr bwMode="auto">
           <a:xfrm>
-            <a:off x="4553602" y="534484"/>
-            <a:ext cx="4590398" cy="4091664"/>
+            <a:off x="5362559" y="0"/>
+            <a:ext cx="2885221" cy="2571750"/>
           </a:xfrm>
           <a:prstGeom prst="rect">
             <a:avLst/>
@@ -15894,6 +15941,179 @@
           </a:extLst>
         </p:spPr>
       </p:pic>
+      <p:pic>
+        <p:nvPicPr>
+          <p:cNvPr id="2" name="Picture 2">
+            <a:extLst>
+              <a:ext uri="{FF2B5EF4-FFF2-40B4-BE49-F238E27FC236}">
+                <a16:creationId xmlns:a16="http://schemas.microsoft.com/office/drawing/2014/main" id="{B7321810-4463-2275-97F9-C1133283C9BD}"/>
+              </a:ext>
+            </a:extLst>
+          </p:cNvPr>
+          <p:cNvPicPr>
+            <a:picLocks noChangeAspect="1" noChangeArrowheads="1"/>
+          </p:cNvPicPr>
+          <p:nvPr/>
+        </p:nvPicPr>
+        <p:blipFill>
+          <a:blip r:embed="rId4">
+            <a:extLst>
+              <a:ext uri="{28A0092B-C50C-407E-A947-70E740481C1C}">
+                <a14:useLocalDpi xmlns:a14="http://schemas.microsoft.com/office/drawing/2010/main" val="0"/>
+              </a:ext>
+            </a:extLst>
+          </a:blip>
+          <a:srcRect/>
+          <a:stretch>
+            <a:fillRect/>
+          </a:stretch>
+        </p:blipFill>
+        <p:spPr bwMode="auto">
+          <a:xfrm>
+            <a:off x="4613879" y="2666274"/>
+            <a:ext cx="2233171" cy="1909600"/>
+          </a:xfrm>
+          <a:prstGeom prst="rect">
+            <a:avLst/>
+          </a:prstGeom>
+          <a:noFill/>
+          <a:ln>
+            <a:solidFill>
+              <a:schemeClr val="tx1"/>
+            </a:solidFill>
+          </a:ln>
+          <a:extLst>
+            <a:ext uri="{909E8E84-426E-40DD-AFC4-6F175D3DCCD1}">
+              <a14:hiddenFill xmlns:a14="http://schemas.microsoft.com/office/drawing/2010/main">
+                <a:solidFill>
+                  <a:srgbClr val="FFFFFF"/>
+                </a:solidFill>
+              </a14:hiddenFill>
+            </a:ext>
+          </a:extLst>
+        </p:spPr>
+      </p:pic>
+      <p:pic>
+        <p:nvPicPr>
+          <p:cNvPr id="5" name="Picture 2">
+            <a:extLst>
+              <a:ext uri="{FF2B5EF4-FFF2-40B4-BE49-F238E27FC236}">
+                <a16:creationId xmlns:a16="http://schemas.microsoft.com/office/drawing/2014/main" id="{7B03D4CA-56A1-6719-EE3D-6B7F02259691}"/>
+              </a:ext>
+            </a:extLst>
+          </p:cNvPr>
+          <p:cNvPicPr>
+            <a:picLocks noChangeAspect="1" noChangeArrowheads="1"/>
+          </p:cNvPicPr>
+          <p:nvPr/>
+        </p:nvPicPr>
+        <p:blipFill>
+          <a:blip r:embed="rId5"/>
+          <a:srcRect/>
+          <a:stretch/>
+        </p:blipFill>
+        <p:spPr bwMode="auto">
+          <a:xfrm>
+            <a:off x="6903801" y="2665595"/>
+            <a:ext cx="2198317" cy="1913870"/>
+          </a:xfrm>
+          <a:prstGeom prst="rect">
+            <a:avLst/>
+          </a:prstGeom>
+          <a:noFill/>
+          <a:ln>
+            <a:solidFill>
+              <a:schemeClr val="tx1"/>
+            </a:solidFill>
+          </a:ln>
+          <a:extLst>
+            <a:ext uri="{909E8E84-426E-40DD-AFC4-6F175D3DCCD1}">
+              <a14:hiddenFill xmlns:a14="http://schemas.microsoft.com/office/drawing/2010/main">
+                <a:solidFill>
+                  <a:srgbClr val="FFFFFF"/>
+                </a:solidFill>
+              </a14:hiddenFill>
+            </a:ext>
+          </a:extLst>
+        </p:spPr>
+      </p:pic>
+      <p:sp>
+        <p:nvSpPr>
+          <p:cNvPr id="6" name="TextBox 5">
+            <a:extLst>
+              <a:ext uri="{FF2B5EF4-FFF2-40B4-BE49-F238E27FC236}">
+                <a16:creationId xmlns:a16="http://schemas.microsoft.com/office/drawing/2014/main" id="{5B40ACC2-4283-0B8C-15BB-C69480C3338C}"/>
+              </a:ext>
+            </a:extLst>
+          </p:cNvPr>
+          <p:cNvSpPr txBox="1"/>
+          <p:nvPr/>
+        </p:nvSpPr>
+        <p:spPr>
+          <a:xfrm>
+            <a:off x="7110538" y="4676701"/>
+            <a:ext cx="1696177" cy="307777"/>
+          </a:xfrm>
+          <a:prstGeom prst="rect">
+            <a:avLst/>
+          </a:prstGeom>
+          <a:noFill/>
+        </p:spPr>
+        <p:txBody>
+          <a:bodyPr wrap="square" rtlCol="0">
+            <a:spAutoFit/>
+          </a:bodyPr>
+          <a:lstStyle/>
+          <a:p>
+            <a:pPr algn="ctr"/>
+            <a:r>
+              <a:rPr lang="fr-FR" b="1" u="sng" dirty="0"/>
+              <a:t>DBSCAN</a:t>
+            </a:r>
+          </a:p>
+        </p:txBody>
+      </p:sp>
+      <p:sp>
+        <p:nvSpPr>
+          <p:cNvPr id="7" name="TextBox 6">
+            <a:extLst>
+              <a:ext uri="{FF2B5EF4-FFF2-40B4-BE49-F238E27FC236}">
+                <a16:creationId xmlns:a16="http://schemas.microsoft.com/office/drawing/2014/main" id="{224EE615-A44F-3650-A163-3187B1ED3B85}"/>
+              </a:ext>
+            </a:extLst>
+          </p:cNvPr>
+          <p:cNvSpPr txBox="1"/>
+          <p:nvPr/>
+        </p:nvSpPr>
+        <p:spPr>
+          <a:xfrm>
+            <a:off x="4840495" y="4676700"/>
+            <a:ext cx="1696177" cy="307777"/>
+          </a:xfrm>
+          <a:prstGeom prst="rect">
+            <a:avLst/>
+          </a:prstGeom>
+          <a:noFill/>
+        </p:spPr>
+        <p:txBody>
+          <a:bodyPr wrap="square" rtlCol="0">
+            <a:spAutoFit/>
+          </a:bodyPr>
+          <a:lstStyle/>
+          <a:p>
+            <a:pPr algn="ctr"/>
+            <a:r>
+              <a:rPr lang="fr-FR" b="1" u="sng" dirty="0"/>
+              <a:t>K-</a:t>
+            </a:r>
+            <a:r>
+              <a:rPr lang="fr-FR" b="1" u="sng" dirty="0" err="1"/>
+              <a:t>means</a:t>
+            </a:r>
+            <a:endParaRPr lang="fr-FR" b="1" u="sng" dirty="0"/>
+          </a:p>
+        </p:txBody>
+      </p:sp>
     </p:spTree>
     <p:extLst>
       <p:ext uri="{BB962C8B-B14F-4D97-AF65-F5344CB8AC3E}">
@@ -15926,152 +16146,10 @@
       </p:grpSpPr>
       <p:sp>
         <p:nvSpPr>
-          <p:cNvPr id="4" name="Text Placeholder 3">
+          <p:cNvPr id="5" name="Title 4">
             <a:extLst>
               <a:ext uri="{FF2B5EF4-FFF2-40B4-BE49-F238E27FC236}">
-                <a16:creationId xmlns:a16="http://schemas.microsoft.com/office/drawing/2014/main" id="{41610F1B-947A-3609-E34C-6D6EF6D3BCE2}"/>
-              </a:ext>
-            </a:extLst>
-          </p:cNvPr>
-          <p:cNvSpPr>
-            <a:spLocks noGrp="1"/>
-          </p:cNvSpPr>
-          <p:nvPr>
-            <p:ph type="body" idx="1"/>
-          </p:nvPr>
-        </p:nvSpPr>
-        <p:spPr>
-          <a:xfrm>
-            <a:off x="0" y="722721"/>
-            <a:ext cx="4439473" cy="3820557"/>
-          </a:xfrm>
-        </p:spPr>
-        <p:txBody>
-          <a:bodyPr/>
-          <a:lstStyle/>
-          <a:p>
-            <a:pPr>
-              <a:lnSpc>
-                <a:spcPct val="200000"/>
-              </a:lnSpc>
-            </a:pPr>
-            <a:r>
-              <a:rPr lang="en-US" sz="1400" dirty="0">
-                <a:solidFill>
-                  <a:schemeClr val="tx1"/>
-                </a:solidFill>
-              </a:rPr>
-              <a:t>Our model has a </a:t>
-            </a:r>
-            <a:r>
-              <a:rPr lang="en-US" sz="1400" b="1" dirty="0">
-                <a:solidFill>
-                  <a:schemeClr val="tx1"/>
-                </a:solidFill>
-              </a:rPr>
-              <a:t>good Silhouette score at 0,597 </a:t>
-            </a:r>
-            <a:r>
-              <a:rPr lang="en-US" sz="1400" dirty="0">
-                <a:solidFill>
-                  <a:schemeClr val="tx1"/>
-                </a:solidFill>
-              </a:rPr>
-              <a:t>on the whole dataset.</a:t>
-            </a:r>
-          </a:p>
-          <a:p>
-            <a:pPr>
-              <a:lnSpc>
-                <a:spcPct val="200000"/>
-              </a:lnSpc>
-            </a:pPr>
-            <a:r>
-              <a:rPr lang="en-US" sz="1400" b="1" dirty="0">
-                <a:solidFill>
-                  <a:schemeClr val="tx1"/>
-                </a:solidFill>
-              </a:rPr>
-              <a:t>Stability score = 1</a:t>
-            </a:r>
-            <a:r>
-              <a:rPr lang="en-US" sz="1400" dirty="0">
-                <a:solidFill>
-                  <a:schemeClr val="tx1"/>
-                </a:solidFill>
-              </a:rPr>
-              <a:t>.</a:t>
-            </a:r>
-          </a:p>
-          <a:p>
-            <a:pPr>
-              <a:lnSpc>
-                <a:spcPct val="200000"/>
-              </a:lnSpc>
-            </a:pPr>
-            <a:r>
-              <a:rPr lang="en-US" sz="1400" dirty="0">
-                <a:solidFill>
-                  <a:schemeClr val="tx1"/>
-                </a:solidFill>
-              </a:rPr>
-              <a:t>It separates the dataset in </a:t>
-            </a:r>
-            <a:r>
-              <a:rPr lang="en-US" sz="1400" b="1" dirty="0">
-                <a:solidFill>
-                  <a:schemeClr val="tx1"/>
-                </a:solidFill>
-              </a:rPr>
-              <a:t>6 clusters.</a:t>
-            </a:r>
-          </a:p>
-          <a:p>
-            <a:pPr>
-              <a:lnSpc>
-                <a:spcPct val="200000"/>
-              </a:lnSpc>
-            </a:pPr>
-            <a:r>
-              <a:rPr lang="en-US" sz="1400" dirty="0">
-                <a:solidFill>
-                  <a:schemeClr val="tx1"/>
-                </a:solidFill>
-              </a:rPr>
-              <a:t>There is an </a:t>
-            </a:r>
-            <a:r>
-              <a:rPr lang="en-US" sz="1400" b="1" dirty="0">
-                <a:solidFill>
-                  <a:schemeClr val="tx1"/>
-                </a:solidFill>
-              </a:rPr>
-              <a:t>unequal distribution of the samples in those clusters</a:t>
-            </a:r>
-          </a:p>
-          <a:p>
-            <a:pPr>
-              <a:lnSpc>
-                <a:spcPct val="200000"/>
-              </a:lnSpc>
-            </a:pPr>
-            <a:r>
-              <a:rPr lang="en-US" sz="1400" b="1" dirty="0">
-                <a:solidFill>
-                  <a:schemeClr val="tx1"/>
-                </a:solidFill>
-              </a:rPr>
-              <a:t>Cluster 0 (in blue) predominant.</a:t>
-            </a:r>
-          </a:p>
-        </p:txBody>
-      </p:sp>
-      <p:sp>
-        <p:nvSpPr>
-          <p:cNvPr id="3" name="Title 2">
-            <a:extLst>
-              <a:ext uri="{FF2B5EF4-FFF2-40B4-BE49-F238E27FC236}">
-                <a16:creationId xmlns:a16="http://schemas.microsoft.com/office/drawing/2014/main" id="{A322F525-530E-A285-102A-0D4820D7ACF5}"/>
+                <a16:creationId xmlns:a16="http://schemas.microsoft.com/office/drawing/2014/main" id="{60C78BCB-32F3-F952-8610-5F51DB329F0B}"/>
               </a:ext>
             </a:extLst>
           </p:cNvPr>
@@ -16082,80 +16160,22 @@
             <p:ph type="title"/>
           </p:nvPr>
         </p:nvSpPr>
-        <p:spPr>
-          <a:xfrm>
-            <a:off x="363551" y="153240"/>
-            <a:ext cx="3864600" cy="863367"/>
-          </a:xfrm>
-        </p:spPr>
+        <p:spPr/>
         <p:txBody>
           <a:bodyPr/>
           <a:lstStyle/>
           <a:p>
             <a:r>
-              <a:rPr lang="en-US" b="1" dirty="0">
-                <a:solidFill>
-                  <a:schemeClr val="tx1"/>
-                </a:solidFill>
-              </a:rPr>
+              <a:rPr lang="en-US" dirty="0"/>
               <a:t>Final Model Performance</a:t>
             </a:r>
-            <a:endParaRPr lang="en-US" b="1" dirty="0">
-              <a:solidFill>
-                <a:srgbClr val="FF0000"/>
-              </a:solidFill>
-            </a:endParaRPr>
           </a:p>
         </p:txBody>
       </p:sp>
-      <p:pic>
-        <p:nvPicPr>
-          <p:cNvPr id="2050" name="Picture 2">
-            <a:extLst>
-              <a:ext uri="{FF2B5EF4-FFF2-40B4-BE49-F238E27FC236}">
-                <a16:creationId xmlns:a16="http://schemas.microsoft.com/office/drawing/2014/main" id="{F8BBC463-10EE-08A2-79CF-7DC2A094B698}"/>
-              </a:ext>
-            </a:extLst>
-          </p:cNvPr>
-          <p:cNvPicPr>
-            <a:picLocks noChangeAspect="1" noChangeArrowheads="1"/>
-          </p:cNvPicPr>
-          <p:nvPr/>
-        </p:nvPicPr>
-        <p:blipFill>
-          <a:blip r:embed="rId3"/>
-          <a:srcRect/>
-          <a:stretch/>
-        </p:blipFill>
-        <p:spPr bwMode="auto">
-          <a:xfrm>
-            <a:off x="4563146" y="878971"/>
-            <a:ext cx="4580854" cy="3385557"/>
-          </a:xfrm>
-          <a:prstGeom prst="rect">
-            <a:avLst/>
-          </a:prstGeom>
-          <a:noFill/>
-          <a:ln>
-            <a:solidFill>
-              <a:schemeClr val="tx1"/>
-            </a:solidFill>
-          </a:ln>
-          <a:extLst>
-            <a:ext uri="{909E8E84-426E-40DD-AFC4-6F175D3DCCD1}">
-              <a14:hiddenFill xmlns:a14="http://schemas.microsoft.com/office/drawing/2010/main">
-                <a:solidFill>
-                  <a:srgbClr val="FFFFFF"/>
-                </a:solidFill>
-              </a14:hiddenFill>
-            </a:ext>
-          </a:extLst>
-        </p:spPr>
-      </p:pic>
     </p:spTree>
     <p:extLst>
       <p:ext uri="{BB962C8B-B14F-4D97-AF65-F5344CB8AC3E}">
-        <p14:creationId xmlns:p14="http://schemas.microsoft.com/office/powerpoint/2010/main" val="527889704"/>
+        <p14:creationId xmlns:p14="http://schemas.microsoft.com/office/powerpoint/2010/main" val="1500296093"/>
       </p:ext>
     </p:extLst>
   </p:cSld>
@@ -16200,8 +16220,8 @@
         </p:nvSpPr>
         <p:spPr>
           <a:xfrm>
-            <a:off x="0" y="800016"/>
-            <a:ext cx="4571999" cy="3820557"/>
+            <a:off x="267720" y="583907"/>
+            <a:ext cx="4199578" cy="3869429"/>
           </a:xfrm>
         </p:spPr>
         <p:txBody>
@@ -16219,7 +16239,7 @@
                   <a:schemeClr val="tx1"/>
                 </a:solidFill>
               </a:rPr>
-              <a:t>Our selected model and pipeline uses </a:t>
+              <a:t>Our model has a </a:t>
             </a:r>
             <a:r>
               <a:rPr lang="en-US" sz="1400" b="1" dirty="0">
@@ -16227,7 +16247,7 @@
                   <a:schemeClr val="tx1"/>
                 </a:solidFill>
               </a:rPr>
-              <a:t>the Ridge Classifier </a:t>
+              <a:t>good Silhouette score at 0,597 </a:t>
             </a:r>
             <a:r>
               <a:rPr lang="en-US" sz="1400" dirty="0">
@@ -16235,7 +16255,45 @@
                   <a:schemeClr val="tx1"/>
                 </a:solidFill>
               </a:rPr>
-              <a:t>linear algorithm</a:t>
+              <a:t>on the whole dataset.</a:t>
+            </a:r>
+          </a:p>
+          <a:p>
+            <a:pPr>
+              <a:lnSpc>
+                <a:spcPct val="200000"/>
+              </a:lnSpc>
+            </a:pPr>
+            <a:r>
+              <a:rPr lang="en-US" sz="1400" b="1" dirty="0">
+                <a:solidFill>
+                  <a:schemeClr val="tx1"/>
+                </a:solidFill>
+              </a:rPr>
+              <a:t>Stability score = 1</a:t>
+            </a:r>
+            <a:r>
+              <a:rPr lang="en-US" sz="1400" dirty="0">
+                <a:solidFill>
+                  <a:schemeClr val="tx1"/>
+                </a:solidFill>
+              </a:rPr>
+              <a:t>.</a:t>
+            </a:r>
+          </a:p>
+          <a:p>
+            <a:pPr>
+              <a:lnSpc>
+                <a:spcPct val="200000"/>
+              </a:lnSpc>
+            </a:pPr>
+            <a:r>
+              <a:rPr lang="en-US" sz="1400" dirty="0">
+                <a:solidFill>
+                  <a:schemeClr val="tx1"/>
+                </a:solidFill>
+              </a:rPr>
+              <a:t>It separates the dataset in </a:t>
             </a:r>
             <a:r>
               <a:rPr lang="en-US" sz="1400" b="1" dirty="0">
@@ -16243,20 +16301,31 @@
                   <a:schemeClr val="tx1"/>
                 </a:solidFill>
               </a:rPr>
-              <a:t>.</a:t>
+              <a:t>6 clusters.</a:t>
             </a:r>
           </a:p>
           <a:p>
             <a:pPr>
               <a:lnSpc>
-                <a:spcPct val="100000"/>
+                <a:spcPct val="200000"/>
               </a:lnSpc>
             </a:pPr>
-            <a:endParaRPr lang="en-US" sz="1400" dirty="0">
-              <a:solidFill>
-                <a:schemeClr val="tx1"/>
-              </a:solidFill>
-            </a:endParaRPr>
+            <a:r>
+              <a:rPr lang="en-US" sz="1400" dirty="0">
+                <a:solidFill>
+                  <a:schemeClr val="tx1"/>
+                </a:solidFill>
+              </a:rPr>
+              <a:t>There is an </a:t>
+            </a:r>
+            <a:r>
+              <a:rPr lang="en-US" sz="1400" b="1" dirty="0">
+                <a:solidFill>
+                  <a:schemeClr val="tx1"/>
+                </a:solidFill>
+              </a:rPr>
+              <a:t>unequal distribution of the samples in those clusters</a:t>
+            </a:r>
           </a:p>
           <a:p>
             <a:pPr>
@@ -16270,20 +16339,24 @@
                   <a:schemeClr val="tx1"/>
                 </a:solidFill>
               </a:rPr>
-              <a:t>Final ROC AUC Score : 0,76</a:t>
+              <a:t>Cluster 1 </a:t>
             </a:r>
-          </a:p>
-          <a:p>
-            <a:pPr>
-              <a:lnSpc>
-                <a:spcPct val="100000"/>
-              </a:lnSpc>
-            </a:pPr>
-            <a:endParaRPr lang="en-US" sz="1400" b="1" dirty="0">
-              <a:solidFill>
-                <a:schemeClr val="tx1"/>
-              </a:solidFill>
-            </a:endParaRPr>
+            <a:r>
+              <a:rPr lang="en-US" sz="1400" dirty="0">
+                <a:solidFill>
+                  <a:schemeClr val="tx1"/>
+                </a:solidFill>
+              </a:rPr>
+              <a:t>contains </a:t>
+            </a:r>
+            <a:r>
+              <a:rPr lang="en-US" sz="1400" b="1" dirty="0">
+                <a:solidFill>
+                  <a:schemeClr val="tx1"/>
+                </a:solidFill>
+              </a:rPr>
+              <a:t>42% of samples.</a:t>
+            </a:r>
           </a:p>
           <a:p>
             <a:pPr>
@@ -16297,67 +16370,7 @@
                   <a:schemeClr val="tx1"/>
                 </a:solidFill>
               </a:rPr>
-              <a:t>Detects 70% of bad borrowers </a:t>
-            </a:r>
-            <a:r>
-              <a:rPr lang="en-US" sz="1400" dirty="0">
-                <a:solidFill>
-                  <a:schemeClr val="tx1"/>
-                </a:solidFill>
-              </a:rPr>
-              <a:t>at the cost of a </a:t>
-            </a:r>
-            <a:r>
-              <a:rPr lang="en-US" sz="1400" b="1" dirty="0">
-                <a:solidFill>
-                  <a:schemeClr val="tx1"/>
-                </a:solidFill>
-              </a:rPr>
-              <a:t>misdetection of 30% of good borrowers</a:t>
-            </a:r>
-          </a:p>
-          <a:p>
-            <a:pPr marL="171450" indent="0">
-              <a:lnSpc>
-                <a:spcPct val="100000"/>
-              </a:lnSpc>
-              <a:buNone/>
-            </a:pPr>
-            <a:endParaRPr lang="en-US" sz="1400" b="1" dirty="0">
-              <a:solidFill>
-                <a:schemeClr val="tx1"/>
-              </a:solidFill>
-            </a:endParaRPr>
-          </a:p>
-          <a:p>
-            <a:pPr>
-              <a:lnSpc>
-                <a:spcPct val="200000"/>
-              </a:lnSpc>
-            </a:pPr>
-            <a:r>
-              <a:rPr lang="en-US" sz="1400" dirty="0">
-                <a:solidFill>
-                  <a:schemeClr val="tx1"/>
-                </a:solidFill>
-              </a:rPr>
-              <a:t>Features with the highest coefficients : extracted from the Credit Card dataset</a:t>
-            </a:r>
-          </a:p>
-          <a:p>
-            <a:pPr marL="171450" indent="0">
-              <a:lnSpc>
-                <a:spcPct val="200000"/>
-              </a:lnSpc>
-              <a:buNone/>
-            </a:pPr>
-            <a:r>
-              <a:rPr lang="en-US" sz="1400" dirty="0">
-                <a:solidFill>
-                  <a:schemeClr val="tx1"/>
-                </a:solidFill>
-              </a:rPr>
-              <a:t> </a:t>
+              <a:t>Cluster 2 : ~23% of samples</a:t>
             </a:r>
           </a:p>
         </p:txBody>
@@ -16380,8 +16393,8 @@
         </p:nvSpPr>
         <p:spPr>
           <a:xfrm>
-            <a:off x="344501" y="324690"/>
-            <a:ext cx="3864600" cy="419589"/>
+            <a:off x="344501" y="102492"/>
+            <a:ext cx="3864600" cy="414300"/>
           </a:xfrm>
         </p:spPr>
         <p:txBody>
@@ -16389,14 +16402,14 @@
           <a:lstStyle/>
           <a:p>
             <a:r>
-              <a:rPr lang="en-US" sz="2200" b="1" dirty="0">
+              <a:rPr lang="en-US" b="1" dirty="0">
                 <a:solidFill>
                   <a:schemeClr val="tx1"/>
                 </a:solidFill>
               </a:rPr>
-              <a:t>Selected Model</a:t>
+              <a:t>Performance Metrics</a:t>
             </a:r>
-            <a:endParaRPr lang="en-US" sz="2200" b="1" dirty="0">
+            <a:endParaRPr lang="en-US" b="1" dirty="0">
               <a:solidFill>
                 <a:srgbClr val="FF0000"/>
               </a:solidFill>
@@ -16406,10 +16419,10 @@
       </p:sp>
       <p:pic>
         <p:nvPicPr>
-          <p:cNvPr id="3076" name="Picture 4">
+          <p:cNvPr id="2050" name="Picture 2">
             <a:extLst>
               <a:ext uri="{FF2B5EF4-FFF2-40B4-BE49-F238E27FC236}">
-                <a16:creationId xmlns:a16="http://schemas.microsoft.com/office/drawing/2014/main" id="{4D519F58-E478-C36F-3DFB-A223B3F02154}"/>
+                <a16:creationId xmlns:a16="http://schemas.microsoft.com/office/drawing/2014/main" id="{F8BBC463-10EE-08A2-79CF-7DC2A094B698}"/>
               </a:ext>
             </a:extLst>
           </p:cNvPr>
@@ -16419,22 +16432,14 @@
           <p:nvPr/>
         </p:nvPicPr>
         <p:blipFill>
-          <a:blip r:embed="rId3">
-            <a:extLst>
-              <a:ext uri="{28A0092B-C50C-407E-A947-70E740481C1C}">
-                <a14:useLocalDpi xmlns:a14="http://schemas.microsoft.com/office/drawing/2010/main" val="0"/>
-              </a:ext>
-            </a:extLst>
-          </a:blip>
+          <a:blip r:embed="rId3"/>
           <a:srcRect/>
-          <a:stretch>
-            <a:fillRect/>
-          </a:stretch>
+          <a:stretch/>
         </p:blipFill>
         <p:spPr bwMode="auto">
           <a:xfrm>
-            <a:off x="4571999" y="0"/>
-            <a:ext cx="4572001" cy="3421082"/>
+            <a:off x="5029127" y="0"/>
+            <a:ext cx="3636150" cy="2687358"/>
           </a:xfrm>
           <a:prstGeom prst="rect">
             <a:avLst/>
@@ -16458,43 +16463,116 @@
       </p:pic>
       <p:pic>
         <p:nvPicPr>
-          <p:cNvPr id="5" name="Picture 4">
+          <p:cNvPr id="2" name="Picture 2">
             <a:extLst>
               <a:ext uri="{FF2B5EF4-FFF2-40B4-BE49-F238E27FC236}">
-                <a16:creationId xmlns:a16="http://schemas.microsoft.com/office/drawing/2014/main" id="{467F2CB3-F4F1-810A-03F5-AB0DCF9770A3}"/>
+                <a16:creationId xmlns:a16="http://schemas.microsoft.com/office/drawing/2014/main" id="{DEA3C179-4F6E-EE7C-2220-B3078F7123A5}"/>
               </a:ext>
             </a:extLst>
           </p:cNvPr>
           <p:cNvPicPr>
-            <a:picLocks noChangeAspect="1"/>
+            <a:picLocks noChangeAspect="1" noChangeArrowheads="1"/>
           </p:cNvPicPr>
           <p:nvPr/>
         </p:nvPicPr>
         <p:blipFill>
           <a:blip r:embed="rId4"/>
-          <a:stretch>
-            <a:fillRect/>
-          </a:stretch>
+          <a:srcRect/>
+          <a:stretch/>
         </p:blipFill>
-        <p:spPr>
+        <p:spPr bwMode="auto">
           <a:xfrm>
-            <a:off x="5096848" y="3437731"/>
-            <a:ext cx="3522302" cy="1705769"/>
+            <a:off x="4553504" y="2687358"/>
+            <a:ext cx="4587397" cy="2450033"/>
           </a:xfrm>
           <a:prstGeom prst="rect">
             <a:avLst/>
           </a:prstGeom>
+          <a:noFill/>
           <a:ln>
             <a:solidFill>
               <a:schemeClr val="tx1"/>
             </a:solidFill>
           </a:ln>
+          <a:extLst>
+            <a:ext uri="{909E8E84-426E-40DD-AFC4-6F175D3DCCD1}">
+              <a14:hiddenFill xmlns:a14="http://schemas.microsoft.com/office/drawing/2010/main">
+                <a:solidFill>
+                  <a:srgbClr val="FFFFFF"/>
+                </a:solidFill>
+              </a14:hiddenFill>
+            </a:ext>
+          </a:extLst>
         </p:spPr>
       </p:pic>
+      <p:sp>
+        <p:nvSpPr>
+          <p:cNvPr id="6" name="TextBox 5">
+            <a:extLst>
+              <a:ext uri="{FF2B5EF4-FFF2-40B4-BE49-F238E27FC236}">
+                <a16:creationId xmlns:a16="http://schemas.microsoft.com/office/drawing/2014/main" id="{EFBA6BD1-A3C1-D883-2717-0E6453427874}"/>
+              </a:ext>
+            </a:extLst>
+          </p:cNvPr>
+          <p:cNvSpPr txBox="1"/>
+          <p:nvPr/>
+        </p:nvSpPr>
+        <p:spPr>
+          <a:xfrm>
+            <a:off x="4572000" y="4160171"/>
+            <a:ext cx="1333210" cy="900246"/>
+          </a:xfrm>
+          <a:prstGeom prst="rect">
+            <a:avLst/>
+          </a:prstGeom>
+          <a:noFill/>
+        </p:spPr>
+        <p:txBody>
+          <a:bodyPr wrap="square" rtlCol="0">
+            <a:spAutoFit/>
+          </a:bodyPr>
+          <a:lstStyle/>
+          <a:p>
+            <a:pPr algn="ctr"/>
+            <a:r>
+              <a:rPr lang="fr-FR" sz="1050" u="sng" dirty="0"/>
+              <a:t>Disclaimer :</a:t>
+            </a:r>
+          </a:p>
+          <a:p>
+            <a:pPr algn="just"/>
+            <a:r>
+              <a:rPr lang="fr-FR" sz="1050" dirty="0"/>
+              <a:t>The clusters have been </a:t>
+            </a:r>
+            <a:r>
+              <a:rPr lang="fr-FR" sz="1050" dirty="0" err="1"/>
+              <a:t>shifted</a:t>
+            </a:r>
+            <a:r>
+              <a:rPr lang="fr-FR" sz="1050" dirty="0"/>
+              <a:t> from 0-5 to 1-6 for </a:t>
+            </a:r>
+            <a:r>
+              <a:rPr lang="fr-FR" sz="1050" dirty="0" err="1"/>
+              <a:t>easier</a:t>
+            </a:r>
+            <a:r>
+              <a:rPr lang="fr-FR" sz="1050" dirty="0"/>
+              <a:t> </a:t>
+            </a:r>
+            <a:r>
+              <a:rPr lang="fr-FR" sz="1050" dirty="0" err="1"/>
+              <a:t>visualization</a:t>
+            </a:r>
+            <a:endParaRPr lang="fr-FR" sz="1050" dirty="0"/>
+          </a:p>
+        </p:txBody>
+      </p:sp>
     </p:spTree>
     <p:extLst>
       <p:ext uri="{BB962C8B-B14F-4D97-AF65-F5344CB8AC3E}">
-        <p14:creationId xmlns:p14="http://schemas.microsoft.com/office/powerpoint/2010/main" val="3335712250"/>
+        <p14:creationId xmlns:p14="http://schemas.microsoft.com/office/powerpoint/2010/main" val="527889704"/>
       </p:ext>
     </p:extLst>
   </p:cSld>
@@ -16523,10 +16601,253 @@
       </p:grpSpPr>
       <p:sp>
         <p:nvSpPr>
-          <p:cNvPr id="5" name="Title 4">
+          <p:cNvPr id="4" name="Text Placeholder 3">
             <a:extLst>
               <a:ext uri="{FF2B5EF4-FFF2-40B4-BE49-F238E27FC236}">
-                <a16:creationId xmlns:a16="http://schemas.microsoft.com/office/drawing/2014/main" id="{60C78BCB-32F3-F952-8610-5F51DB329F0B}"/>
+                <a16:creationId xmlns:a16="http://schemas.microsoft.com/office/drawing/2014/main" id="{41610F1B-947A-3609-E34C-6D6EF6D3BCE2}"/>
+              </a:ext>
+            </a:extLst>
+          </p:cNvPr>
+          <p:cNvSpPr>
+            <a:spLocks noGrp="1"/>
+          </p:cNvSpPr>
+          <p:nvPr>
+            <p:ph type="body" idx="1"/>
+          </p:nvPr>
+        </p:nvSpPr>
+        <p:spPr>
+          <a:xfrm>
+            <a:off x="-139602" y="800016"/>
+            <a:ext cx="4711602" cy="3820557"/>
+          </a:xfrm>
+        </p:spPr>
+        <p:txBody>
+          <a:bodyPr/>
+          <a:lstStyle/>
+          <a:p>
+            <a:pPr>
+              <a:lnSpc>
+                <a:spcPct val="200000"/>
+              </a:lnSpc>
+            </a:pPr>
+            <a:r>
+              <a:rPr lang="en-US" sz="1400" b="1" dirty="0">
+                <a:solidFill>
+                  <a:schemeClr val="tx1"/>
+                </a:solidFill>
+              </a:rPr>
+              <a:t>1</a:t>
+            </a:r>
+            <a:r>
+              <a:rPr lang="en-US" sz="1400" b="1" baseline="30000" dirty="0">
+                <a:solidFill>
+                  <a:schemeClr val="tx1"/>
+                </a:solidFill>
+              </a:rPr>
+              <a:t>st</a:t>
+            </a:r>
+            <a:r>
+              <a:rPr lang="en-US" sz="1400" b="1" dirty="0">
+                <a:solidFill>
+                  <a:schemeClr val="tx1"/>
+                </a:solidFill>
+              </a:rPr>
+              <a:t> PCA plane : </a:t>
+            </a:r>
+            <a:r>
+              <a:rPr lang="en-US" sz="1400" dirty="0">
+                <a:solidFill>
+                  <a:schemeClr val="tx1"/>
+                </a:solidFill>
+              </a:rPr>
+              <a:t>Good separation of 5 clusters</a:t>
+            </a:r>
+          </a:p>
+          <a:p>
+            <a:pPr>
+              <a:lnSpc>
+                <a:spcPct val="100000"/>
+              </a:lnSpc>
+            </a:pPr>
+            <a:endParaRPr lang="en-US" sz="1400" dirty="0">
+              <a:solidFill>
+                <a:schemeClr val="tx1"/>
+              </a:solidFill>
+            </a:endParaRPr>
+          </a:p>
+          <a:p>
+            <a:pPr>
+              <a:lnSpc>
+                <a:spcPct val="200000"/>
+              </a:lnSpc>
+            </a:pPr>
+            <a:r>
+              <a:rPr lang="en-US" sz="1400" b="1" dirty="0">
+                <a:solidFill>
+                  <a:schemeClr val="tx1"/>
+                </a:solidFill>
+              </a:rPr>
+              <a:t>2</a:t>
+            </a:r>
+            <a:r>
+              <a:rPr lang="en-US" sz="1400" b="1" baseline="30000" dirty="0">
+                <a:solidFill>
+                  <a:schemeClr val="tx1"/>
+                </a:solidFill>
+              </a:rPr>
+              <a:t>nd</a:t>
+            </a:r>
+            <a:r>
+              <a:rPr lang="en-US" sz="1400" b="1" dirty="0">
+                <a:solidFill>
+                  <a:schemeClr val="tx1"/>
+                </a:solidFill>
+              </a:rPr>
+              <a:t> PCA plane : </a:t>
+            </a:r>
+            <a:r>
+              <a:rPr lang="en-US" sz="1400" dirty="0">
+                <a:solidFill>
+                  <a:schemeClr val="tx1"/>
+                </a:solidFill>
+              </a:rPr>
+              <a:t>2 clusters clearly separated, slight separation of 3 additional clusters </a:t>
+            </a:r>
+          </a:p>
+          <a:p>
+            <a:pPr>
+              <a:lnSpc>
+                <a:spcPct val="100000"/>
+              </a:lnSpc>
+            </a:pPr>
+            <a:endParaRPr lang="en-US" sz="1400" b="1" dirty="0">
+              <a:solidFill>
+                <a:schemeClr val="tx1"/>
+              </a:solidFill>
+            </a:endParaRPr>
+          </a:p>
+          <a:p>
+            <a:pPr>
+              <a:lnSpc>
+                <a:spcPct val="200000"/>
+              </a:lnSpc>
+            </a:pPr>
+            <a:r>
+              <a:rPr lang="en-US" sz="1400" b="1" dirty="0">
+                <a:solidFill>
+                  <a:schemeClr val="tx1"/>
+                </a:solidFill>
+              </a:rPr>
+              <a:t>3</a:t>
+            </a:r>
+            <a:r>
+              <a:rPr lang="en-US" sz="1400" b="1" baseline="30000" dirty="0">
+                <a:solidFill>
+                  <a:schemeClr val="tx1"/>
+                </a:solidFill>
+              </a:rPr>
+              <a:t>rd</a:t>
+            </a:r>
+            <a:r>
+              <a:rPr lang="en-US" sz="1400" b="1" dirty="0">
+                <a:solidFill>
+                  <a:schemeClr val="tx1"/>
+                </a:solidFill>
+              </a:rPr>
+              <a:t> and 4</a:t>
+            </a:r>
+            <a:r>
+              <a:rPr lang="en-US" sz="1400" b="1" baseline="30000" dirty="0">
+                <a:solidFill>
+                  <a:schemeClr val="tx1"/>
+                </a:solidFill>
+              </a:rPr>
+              <a:t>th</a:t>
+            </a:r>
+            <a:r>
+              <a:rPr lang="en-US" sz="1400" b="1" dirty="0">
+                <a:solidFill>
+                  <a:schemeClr val="tx1"/>
+                </a:solidFill>
+              </a:rPr>
+              <a:t> PCA plane : 6 clusters cleanly separated</a:t>
+            </a:r>
+          </a:p>
+          <a:p>
+            <a:pPr marL="171450" indent="0">
+              <a:lnSpc>
+                <a:spcPct val="100000"/>
+              </a:lnSpc>
+              <a:buNone/>
+            </a:pPr>
+            <a:endParaRPr lang="en-US" sz="1400" b="1" dirty="0">
+              <a:solidFill>
+                <a:schemeClr val="tx1"/>
+              </a:solidFill>
+            </a:endParaRPr>
+          </a:p>
+          <a:p>
+            <a:pPr>
+              <a:lnSpc>
+                <a:spcPct val="200000"/>
+              </a:lnSpc>
+            </a:pPr>
+            <a:r>
+              <a:rPr lang="en-US" sz="1400" dirty="0">
+                <a:solidFill>
+                  <a:schemeClr val="tx1"/>
+                </a:solidFill>
+              </a:rPr>
+              <a:t>Analysis of the shape of our clusters with PCA visualization (5 first components represent 90% of variance) </a:t>
+            </a:r>
+            <a:r>
+              <a:rPr lang="en-US" sz="1400" dirty="0">
+                <a:solidFill>
+                  <a:schemeClr val="tx1"/>
+                </a:solidFill>
+                <a:sym typeface="Wingdings" panose="05000000000000000000" pitchFamily="2" charset="2"/>
+              </a:rPr>
+              <a:t> </a:t>
+            </a:r>
+            <a:r>
+              <a:rPr lang="en-US" sz="1400" b="1" dirty="0">
+                <a:solidFill>
+                  <a:schemeClr val="tx1"/>
+                </a:solidFill>
+                <a:sym typeface="Wingdings" panose="05000000000000000000" pitchFamily="2" charset="2"/>
+              </a:rPr>
+              <a:t>proves the efficiency of our model</a:t>
+            </a:r>
+            <a:endParaRPr lang="en-US" sz="1400" b="1" dirty="0">
+              <a:solidFill>
+                <a:schemeClr val="tx1"/>
+              </a:solidFill>
+            </a:endParaRPr>
+          </a:p>
+          <a:p>
+            <a:pPr marL="171450" indent="0">
+              <a:lnSpc>
+                <a:spcPct val="200000"/>
+              </a:lnSpc>
+              <a:buNone/>
+            </a:pPr>
+            <a:r>
+              <a:rPr lang="en-US" sz="1400" dirty="0">
+                <a:solidFill>
+                  <a:schemeClr val="tx1"/>
+                </a:solidFill>
+              </a:rPr>
+              <a:t> </a:t>
+            </a:r>
+          </a:p>
+        </p:txBody>
+      </p:sp>
+      <p:sp>
+        <p:nvSpPr>
+          <p:cNvPr id="3" name="Title 2">
+            <a:extLst>
+              <a:ext uri="{FF2B5EF4-FFF2-40B4-BE49-F238E27FC236}">
+                <a16:creationId xmlns:a16="http://schemas.microsoft.com/office/drawing/2014/main" id="{A322F525-530E-A285-102A-0D4820D7ACF5}"/>
               </a:ext>
             </a:extLst>
           </p:cNvPr>
@@ -16537,26 +16858,220 @@
             <p:ph type="title"/>
           </p:nvPr>
         </p:nvSpPr>
-        <p:spPr/>
+        <p:spPr>
+          <a:xfrm>
+            <a:off x="344501" y="324690"/>
+            <a:ext cx="3864600" cy="419589"/>
+          </a:xfrm>
+        </p:spPr>
         <p:txBody>
           <a:bodyPr/>
           <a:lstStyle/>
           <a:p>
             <a:r>
-              <a:rPr lang="en-US" dirty="0"/>
-              <a:t>Model Interpretability</a:t>
+              <a:rPr lang="en-US" sz="2200" b="1" dirty="0">
+                <a:solidFill>
+                  <a:schemeClr val="tx1"/>
+                </a:solidFill>
+              </a:rPr>
+              <a:t>Model Shape</a:t>
             </a:r>
-            <a:br>
-              <a:rPr lang="en-US" dirty="0"/>
-            </a:br>
-            <a:endParaRPr lang="en-US" dirty="0"/>
+            <a:endParaRPr lang="en-US" sz="2200" b="1" dirty="0">
+              <a:solidFill>
+                <a:srgbClr val="FF0000"/>
+              </a:solidFill>
+            </a:endParaRPr>
           </a:p>
         </p:txBody>
       </p:sp>
+      <p:pic>
+        <p:nvPicPr>
+          <p:cNvPr id="2" name="Picture 2">
+            <a:extLst>
+              <a:ext uri="{FF2B5EF4-FFF2-40B4-BE49-F238E27FC236}">
+                <a16:creationId xmlns:a16="http://schemas.microsoft.com/office/drawing/2014/main" id="{92A4DC42-0529-034E-CDA4-0C21B9F59BB2}"/>
+              </a:ext>
+            </a:extLst>
+          </p:cNvPr>
+          <p:cNvPicPr>
+            <a:picLocks noChangeAspect="1" noChangeArrowheads="1"/>
+          </p:cNvPicPr>
+          <p:nvPr/>
+        </p:nvPicPr>
+        <p:blipFill>
+          <a:blip r:embed="rId3">
+            <a:extLst>
+              <a:ext uri="{28A0092B-C50C-407E-A947-70E740481C1C}">
+                <a14:useLocalDpi xmlns:a14="http://schemas.microsoft.com/office/drawing/2010/main" val="0"/>
+              </a:ext>
+            </a:extLst>
+          </a:blip>
+          <a:srcRect/>
+          <a:stretch>
+            <a:fillRect/>
+          </a:stretch>
+        </p:blipFill>
+        <p:spPr bwMode="auto">
+          <a:xfrm>
+            <a:off x="4571999" y="617309"/>
+            <a:ext cx="2285612" cy="1954442"/>
+          </a:xfrm>
+          <a:prstGeom prst="rect">
+            <a:avLst/>
+          </a:prstGeom>
+          <a:noFill/>
+          <a:ln>
+            <a:solidFill>
+              <a:schemeClr val="tx1"/>
+            </a:solidFill>
+          </a:ln>
+          <a:extLst>
+            <a:ext uri="{909E8E84-426E-40DD-AFC4-6F175D3DCCD1}">
+              <a14:hiddenFill xmlns:a14="http://schemas.microsoft.com/office/drawing/2010/main">
+                <a:solidFill>
+                  <a:srgbClr val="FFFFFF"/>
+                </a:solidFill>
+              </a14:hiddenFill>
+            </a:ext>
+          </a:extLst>
+        </p:spPr>
+      </p:pic>
+      <p:pic>
+        <p:nvPicPr>
+          <p:cNvPr id="6" name="Picture 2">
+            <a:extLst>
+              <a:ext uri="{FF2B5EF4-FFF2-40B4-BE49-F238E27FC236}">
+                <a16:creationId xmlns:a16="http://schemas.microsoft.com/office/drawing/2014/main" id="{EFD999A7-E9AB-DF69-08B4-46D1AEA20E3D}"/>
+              </a:ext>
+            </a:extLst>
+          </p:cNvPr>
+          <p:cNvPicPr>
+            <a:picLocks noChangeAspect="1" noChangeArrowheads="1"/>
+          </p:cNvPicPr>
+          <p:nvPr/>
+        </p:nvPicPr>
+        <p:blipFill>
+          <a:blip r:embed="rId4"/>
+          <a:srcRect/>
+          <a:stretch/>
+        </p:blipFill>
+        <p:spPr bwMode="auto">
+          <a:xfrm>
+            <a:off x="6862596" y="617308"/>
+            <a:ext cx="2253483" cy="1934091"/>
+          </a:xfrm>
+          <a:prstGeom prst="rect">
+            <a:avLst/>
+          </a:prstGeom>
+          <a:noFill/>
+          <a:ln>
+            <a:solidFill>
+              <a:schemeClr val="tx1"/>
+            </a:solidFill>
+          </a:ln>
+          <a:extLst>
+            <a:ext uri="{909E8E84-426E-40DD-AFC4-6F175D3DCCD1}">
+              <a14:hiddenFill xmlns:a14="http://schemas.microsoft.com/office/drawing/2010/main">
+                <a:solidFill>
+                  <a:srgbClr val="FFFFFF"/>
+                </a:solidFill>
+              </a14:hiddenFill>
+            </a:ext>
+          </a:extLst>
+        </p:spPr>
+      </p:pic>
+      <p:pic>
+        <p:nvPicPr>
+          <p:cNvPr id="7" name="Picture 2">
+            <a:extLst>
+              <a:ext uri="{FF2B5EF4-FFF2-40B4-BE49-F238E27FC236}">
+                <a16:creationId xmlns:a16="http://schemas.microsoft.com/office/drawing/2014/main" id="{D779E4C7-4EB5-2EF6-63AE-2556A83BCC8A}"/>
+              </a:ext>
+            </a:extLst>
+          </p:cNvPr>
+          <p:cNvPicPr>
+            <a:picLocks noChangeAspect="1" noChangeArrowheads="1"/>
+          </p:cNvPicPr>
+          <p:nvPr/>
+        </p:nvPicPr>
+        <p:blipFill>
+          <a:blip r:embed="rId5"/>
+          <a:srcRect/>
+          <a:stretch/>
+        </p:blipFill>
+        <p:spPr bwMode="auto">
+          <a:xfrm>
+            <a:off x="4576208" y="2571751"/>
+            <a:ext cx="2277193" cy="1954442"/>
+          </a:xfrm>
+          <a:prstGeom prst="rect">
+            <a:avLst/>
+          </a:prstGeom>
+          <a:noFill/>
+          <a:ln>
+            <a:solidFill>
+              <a:schemeClr val="tx1"/>
+            </a:solidFill>
+          </a:ln>
+          <a:extLst>
+            <a:ext uri="{909E8E84-426E-40DD-AFC4-6F175D3DCCD1}">
+              <a14:hiddenFill xmlns:a14="http://schemas.microsoft.com/office/drawing/2010/main">
+                <a:solidFill>
+                  <a:srgbClr val="FFFFFF"/>
+                </a:solidFill>
+              </a14:hiddenFill>
+            </a:ext>
+          </a:extLst>
+        </p:spPr>
+      </p:pic>
+      <p:pic>
+        <p:nvPicPr>
+          <p:cNvPr id="8" name="Picture 2">
+            <a:extLst>
+              <a:ext uri="{FF2B5EF4-FFF2-40B4-BE49-F238E27FC236}">
+                <a16:creationId xmlns:a16="http://schemas.microsoft.com/office/drawing/2014/main" id="{4AAB9DB4-B11C-E88D-4868-F8B1EE249861}"/>
+              </a:ext>
+            </a:extLst>
+          </p:cNvPr>
+          <p:cNvPicPr>
+            <a:picLocks noChangeAspect="1" noChangeArrowheads="1"/>
+          </p:cNvPicPr>
+          <p:nvPr/>
+        </p:nvPicPr>
+        <p:blipFill>
+          <a:blip r:embed="rId6"/>
+          <a:srcRect/>
+          <a:stretch/>
+        </p:blipFill>
+        <p:spPr bwMode="auto">
+          <a:xfrm>
+            <a:off x="6860389" y="2571751"/>
+            <a:ext cx="2253483" cy="1954442"/>
+          </a:xfrm>
+          <a:prstGeom prst="rect">
+            <a:avLst/>
+          </a:prstGeom>
+          <a:noFill/>
+          <a:ln>
+            <a:solidFill>
+              <a:schemeClr val="tx1"/>
+            </a:solidFill>
+          </a:ln>
+          <a:extLst>
+            <a:ext uri="{909E8E84-426E-40DD-AFC4-6F175D3DCCD1}">
+              <a14:hiddenFill xmlns:a14="http://schemas.microsoft.com/office/drawing/2010/main">
+                <a:solidFill>
+                  <a:srgbClr val="FFFFFF"/>
+                </a:solidFill>
+              </a14:hiddenFill>
+            </a:ext>
+          </a:extLst>
+        </p:spPr>
+      </p:pic>
     </p:spTree>
     <p:extLst>
       <p:ext uri="{BB962C8B-B14F-4D97-AF65-F5344CB8AC3E}">
-        <p14:creationId xmlns:p14="http://schemas.microsoft.com/office/powerpoint/2010/main" val="1500296093"/>
+        <p14:creationId xmlns:p14="http://schemas.microsoft.com/office/powerpoint/2010/main" val="3335712250"/>
       </p:ext>
     </p:extLst>
   </p:cSld>
@@ -16601,8 +17116,8 @@
         </p:nvSpPr>
         <p:spPr>
           <a:xfrm>
-            <a:off x="344501" y="788908"/>
-            <a:ext cx="3961685" cy="4240291"/>
+            <a:off x="-167523" y="451604"/>
+            <a:ext cx="4739523" cy="4240291"/>
           </a:xfrm>
         </p:spPr>
         <p:txBody>
@@ -16615,163 +17130,396 @@
               </a:lnSpc>
             </a:pPr>
             <a:r>
-              <a:rPr lang="en-US" sz="1400" dirty="0">
+              <a:rPr lang="en-US" sz="900" b="1" dirty="0">
+                <a:solidFill>
+                  <a:schemeClr val="accent1">
+                    <a:lumMod val="75000"/>
+                  </a:schemeClr>
+                </a:solidFill>
+              </a:rPr>
+              <a:t>Segment 1:</a:t>
+            </a:r>
+            <a:r>
+              <a:rPr lang="en-US" sz="900" dirty="0">
                 <a:solidFill>
                   <a:schemeClr val="tx1"/>
                 </a:solidFill>
               </a:rPr>
-              <a:t>Goals: </a:t>
+              <a:t> </a:t>
             </a:r>
-          </a:p>
-          <a:p>
-            <a:pPr lvl="1">
+            <a:r>
+              <a:rPr lang="en-US" sz="900" b="1" dirty="0">
+                <a:solidFill>
+                  <a:schemeClr val="tx1"/>
+                </a:solidFill>
+              </a:rPr>
+              <a:t>Sao Paulo area</a:t>
+            </a:r>
+            <a:r>
+              <a:rPr lang="en-US" sz="900" dirty="0">
+                <a:solidFill>
+                  <a:schemeClr val="tx1"/>
+                </a:solidFill>
+              </a:rPr>
+              <a:t>, mostly interested </a:t>
+            </a:r>
+            <a:r>
+              <a:rPr lang="en-US" sz="900" b="1" dirty="0">
+                <a:solidFill>
+                  <a:schemeClr val="tx1"/>
+                </a:solidFill>
+              </a:rPr>
+              <a:t>in health, beauty, housewares, bed, bath, tables and perfumery products, </a:t>
+            </a:r>
+            <a:r>
+              <a:rPr lang="en-US" sz="900" dirty="0">
+                <a:solidFill>
+                  <a:schemeClr val="tx1"/>
+                </a:solidFill>
+              </a:rPr>
+              <a:t>requests </a:t>
+            </a:r>
+            <a:r>
+              <a:rPr lang="en-US" sz="900" b="1" dirty="0">
+                <a:solidFill>
+                  <a:schemeClr val="tx1"/>
+                </a:solidFill>
+              </a:rPr>
+              <a:t>low shipping delay </a:t>
+            </a:r>
+            <a:r>
+              <a:rPr lang="en-US" sz="900" dirty="0">
+                <a:solidFill>
+                  <a:schemeClr val="tx1"/>
+                </a:solidFill>
+              </a:rPr>
+              <a:t>and buys </a:t>
+            </a:r>
+            <a:r>
+              <a:rPr lang="en-US" sz="900" b="1" dirty="0">
+                <a:solidFill>
+                  <a:schemeClr val="tx1"/>
+                </a:solidFill>
+              </a:rPr>
+              <a:t>low price products</a:t>
+            </a:r>
+            <a:r>
+              <a:rPr lang="en-US" sz="900" dirty="0">
+                <a:solidFill>
+                  <a:schemeClr val="tx1"/>
+                </a:solidFill>
+              </a:rPr>
+              <a:t>, gives good review scores</a:t>
+            </a:r>
+          </a:p>
+          <a:p>
+            <a:pPr>
               <a:lnSpc>
                 <a:spcPct val="200000"/>
               </a:lnSpc>
-              <a:buFont typeface="Wingdings" panose="05000000000000000000" pitchFamily="2" charset="2"/>
-              <a:buChar char="Ø"/>
             </a:pPr>
             <a:r>
-              <a:rPr lang="en-US" sz="1400" dirty="0">
+              <a:rPr lang="en-US" sz="900" b="1" dirty="0">
+                <a:solidFill>
+                  <a:srgbClr val="F5B20B"/>
+                </a:solidFill>
+              </a:rPr>
+              <a:t>Segment 2</a:t>
+            </a:r>
+            <a:r>
+              <a:rPr lang="en-US" sz="900" b="1" dirty="0">
+                <a:solidFill>
+                  <a:srgbClr val="FFC000"/>
+                </a:solidFill>
+              </a:rPr>
+              <a:t>: </a:t>
+            </a:r>
+            <a:r>
+              <a:rPr lang="en-US" sz="900" b="1" dirty="0">
                 <a:solidFill>
                   <a:schemeClr val="tx1"/>
                 </a:solidFill>
               </a:rPr>
-              <a:t>Build trust in the model</a:t>
+              <a:t>Likely to cancel order</a:t>
             </a:r>
-          </a:p>
-          <a:p>
-            <a:pPr lvl="1">
+            <a:r>
+              <a:rPr lang="en-US" sz="900" dirty="0">
+                <a:solidFill>
+                  <a:schemeClr val="tx1"/>
+                </a:solidFill>
+              </a:rPr>
+              <a:t>, mostly interested in </a:t>
+            </a:r>
+            <a:r>
+              <a:rPr lang="en-US" sz="900" b="1" dirty="0">
+                <a:solidFill>
+                  <a:schemeClr val="tx1"/>
+                </a:solidFill>
+              </a:rPr>
+              <a:t>telephony, health, beauty and auto products,</a:t>
+            </a:r>
+            <a:r>
+              <a:rPr lang="en-US" sz="900" dirty="0">
+                <a:solidFill>
+                  <a:schemeClr val="tx1"/>
+                </a:solidFill>
+              </a:rPr>
+              <a:t> orders from sellers far from its location, buys a low amount of items but with at a </a:t>
+            </a:r>
+            <a:r>
+              <a:rPr lang="en-US" sz="900" b="1" dirty="0">
+                <a:solidFill>
+                  <a:schemeClr val="tx1"/>
+                </a:solidFill>
+              </a:rPr>
+              <a:t>high price and with a high number of photos</a:t>
+            </a:r>
+            <a:r>
+              <a:rPr lang="en-US" sz="900" dirty="0">
+                <a:solidFill>
+                  <a:schemeClr val="tx1"/>
+                </a:solidFill>
+              </a:rPr>
+              <a:t>.</a:t>
+            </a:r>
+          </a:p>
+          <a:p>
+            <a:pPr>
               <a:lnSpc>
                 <a:spcPct val="200000"/>
               </a:lnSpc>
-              <a:buFont typeface="Wingdings" panose="05000000000000000000" pitchFamily="2" charset="2"/>
-              <a:buChar char="Ø"/>
             </a:pPr>
             <a:r>
-              <a:rPr lang="en-US" sz="1400" dirty="0">
+              <a:rPr lang="en-US" sz="900" b="1" dirty="0">
+                <a:solidFill>
+                  <a:schemeClr val="accent4">
+                    <a:lumMod val="75000"/>
+                  </a:schemeClr>
+                </a:solidFill>
+              </a:rPr>
+              <a:t>Segment 3: </a:t>
+            </a:r>
+            <a:r>
+              <a:rPr lang="en-US" sz="900" b="1" dirty="0">
                 <a:solidFill>
                   <a:schemeClr val="tx1"/>
                 </a:solidFill>
               </a:rPr>
-              <a:t>Interpret the probabilities</a:t>
+              <a:t>Rio de Janeiro area</a:t>
             </a:r>
-          </a:p>
-          <a:p>
-            <a:pPr lvl="1">
+            <a:r>
+              <a:rPr lang="en-US" sz="900" dirty="0">
+                <a:solidFill>
+                  <a:schemeClr val="tx1"/>
+                </a:solidFill>
+              </a:rPr>
+              <a:t>, mostly interested in t</a:t>
+            </a:r>
+            <a:r>
+              <a:rPr lang="en-US" sz="900" b="1" dirty="0">
+                <a:solidFill>
+                  <a:schemeClr val="tx1"/>
+                </a:solidFill>
+              </a:rPr>
+              <a:t>oys, perfumery, garden tools, bed, bath and table products</a:t>
+            </a:r>
+            <a:r>
+              <a:rPr lang="en-US" sz="900" dirty="0">
+                <a:solidFill>
+                  <a:schemeClr val="tx1"/>
+                </a:solidFill>
+              </a:rPr>
+              <a:t>, </a:t>
+            </a:r>
+            <a:r>
+              <a:rPr lang="en-US" sz="900" b="1" dirty="0">
+                <a:solidFill>
+                  <a:schemeClr val="tx1"/>
+                </a:solidFill>
+              </a:rPr>
+              <a:t>mostly pays by credit card</a:t>
+            </a:r>
+            <a:r>
+              <a:rPr lang="en-US" sz="900" dirty="0">
+                <a:solidFill>
+                  <a:schemeClr val="tx1"/>
+                </a:solidFill>
+              </a:rPr>
+              <a:t>, </a:t>
+            </a:r>
+            <a:r>
+              <a:rPr lang="en-US" sz="900" b="1" dirty="0">
+                <a:solidFill>
+                  <a:schemeClr val="tx1"/>
+                </a:solidFill>
+              </a:rPr>
+              <a:t>high number of item bought and number of orders.  </a:t>
+            </a:r>
+          </a:p>
+          <a:p>
+            <a:pPr>
               <a:lnSpc>
                 <a:spcPct val="200000"/>
               </a:lnSpc>
-              <a:buFont typeface="Wingdings" panose="05000000000000000000" pitchFamily="2" charset="2"/>
-              <a:buChar char="Ø"/>
             </a:pPr>
             <a:r>
-              <a:rPr lang="en-US" sz="1400" dirty="0">
+              <a:rPr lang="en-US" sz="900" b="1" dirty="0">
+                <a:solidFill>
+                  <a:srgbClr val="FF0000"/>
+                </a:solidFill>
+              </a:rPr>
+              <a:t>Segment 4: </a:t>
+            </a:r>
+            <a:r>
+              <a:rPr lang="en-US" sz="900" b="1" dirty="0">
                 <a:solidFill>
                   <a:schemeClr val="tx1"/>
                 </a:solidFill>
               </a:rPr>
-              <a:t>Importance of different features</a:t>
+              <a:t>Rio Grande do Sul area</a:t>
             </a:r>
-          </a:p>
-          <a:p>
-            <a:pPr lvl="1">
+            <a:r>
+              <a:rPr lang="en-US" sz="900" dirty="0">
+                <a:solidFill>
+                  <a:schemeClr val="tx1"/>
+                </a:solidFill>
+              </a:rPr>
+              <a:t>, mostly interested in </a:t>
+            </a:r>
+            <a:r>
+              <a:rPr lang="en-US" sz="900" b="1" dirty="0">
+                <a:solidFill>
+                  <a:schemeClr val="tx1"/>
+                </a:solidFill>
+              </a:rPr>
+              <a:t>housewares, garden tools, furniture, decor, cool stuff and computer accessories</a:t>
+            </a:r>
+            <a:r>
+              <a:rPr lang="en-US" sz="900" dirty="0">
+                <a:solidFill>
+                  <a:schemeClr val="tx1"/>
+                </a:solidFill>
+              </a:rPr>
+              <a:t>, accepts higher shipping delay, </a:t>
+            </a:r>
+            <a:r>
+              <a:rPr lang="en-US" sz="900" b="1" dirty="0">
+                <a:solidFill>
+                  <a:schemeClr val="tx1"/>
+                </a:solidFill>
+              </a:rPr>
+              <a:t>less likely to use credit card and overpays items</a:t>
+            </a:r>
+            <a:r>
+              <a:rPr lang="en-US" sz="900" dirty="0">
+                <a:solidFill>
+                  <a:schemeClr val="tx1"/>
+                </a:solidFill>
+              </a:rPr>
+              <a:t>.</a:t>
+            </a:r>
+          </a:p>
+          <a:p>
+            <a:pPr>
               <a:lnSpc>
                 <a:spcPct val="200000"/>
               </a:lnSpc>
-              <a:buFont typeface="Wingdings" panose="05000000000000000000" pitchFamily="2" charset="2"/>
-              <a:buChar char="Ø"/>
             </a:pPr>
             <a:r>
-              <a:rPr lang="en-US" sz="1400" dirty="0">
+              <a:rPr lang="en-US" sz="900" b="1" dirty="0">
+                <a:solidFill>
+                  <a:srgbClr val="7030A0"/>
+                </a:solidFill>
+              </a:rPr>
+              <a:t>Segment 5: </a:t>
+            </a:r>
+            <a:r>
+              <a:rPr lang="en-US" sz="900" dirty="0">
                 <a:solidFill>
                   <a:schemeClr val="tx1"/>
                 </a:solidFill>
               </a:rPr>
-              <a:t>Avoid bias</a:t>
+              <a:t>Likely to be a </a:t>
             </a:r>
+            <a:r>
+              <a:rPr lang="en-US" sz="900" b="1" dirty="0">
+                <a:solidFill>
+                  <a:schemeClr val="tx1"/>
+                </a:solidFill>
+              </a:rPr>
+              <a:t>returning customer</a:t>
+            </a:r>
+            <a:r>
+              <a:rPr lang="en-US" sz="900" dirty="0">
+                <a:solidFill>
+                  <a:schemeClr val="tx1"/>
+                </a:solidFill>
+              </a:rPr>
+              <a:t>, mostly interested in </a:t>
+            </a:r>
+            <a:r>
+              <a:rPr lang="en-US" sz="900" b="1" dirty="0">
+                <a:solidFill>
+                  <a:schemeClr val="tx1"/>
+                </a:solidFill>
+              </a:rPr>
+              <a:t>perfumery, garden tools and computer accessories</a:t>
+            </a:r>
+            <a:r>
+              <a:rPr lang="en-US" sz="900" dirty="0">
+                <a:solidFill>
+                  <a:schemeClr val="tx1"/>
+                </a:solidFill>
+              </a:rPr>
+              <a:t>, high review delay.</a:t>
+            </a:r>
           </a:p>
           <a:p>
             <a:pPr>
               <a:lnSpc>
                 <a:spcPct val="200000"/>
               </a:lnSpc>
-              <a:buFont typeface="Arial" panose="020B0604020202020204" pitchFamily="34" charset="0"/>
-              <a:buChar char="•"/>
             </a:pPr>
             <a:r>
-              <a:rPr lang="en-US" sz="1400" b="1" dirty="0">
-                <a:solidFill>
-                  <a:schemeClr val="tx1"/>
+              <a:rPr lang="en-US" sz="900" b="1" dirty="0">
+                <a:solidFill>
+                  <a:srgbClr val="794007"/>
                 </a:solidFill>
               </a:rPr>
-              <a:t>Model based on Linear Regression </a:t>
+              <a:t>Segment 6: </a:t>
             </a:r>
             <a:r>
-              <a:rPr lang="en-US" sz="1400" b="1" dirty="0">
+              <a:rPr lang="en-US" sz="900" b="1" dirty="0">
                 <a:solidFill>
                   <a:schemeClr val="tx1"/>
                 </a:solidFill>
-                <a:sym typeface="Wingdings" panose="05000000000000000000" pitchFamily="2" charset="2"/>
               </a:rPr>
-              <a:t> Easy to explain</a:t>
-            </a:r>
-          </a:p>
-          <a:p>
-            <a:pPr>
-              <a:lnSpc>
-                <a:spcPct val="200000"/>
-              </a:lnSpc>
-              <a:buFont typeface="Arial" panose="020B0604020202020204" pitchFamily="34" charset="0"/>
-              <a:buChar char="•"/>
-            </a:pPr>
-            <a:r>
-              <a:rPr lang="en-US" sz="1400" dirty="0">
-                <a:solidFill>
-                  <a:schemeClr val="tx1"/>
-                </a:solidFill>
-                <a:sym typeface="Wingdings" panose="05000000000000000000" pitchFamily="2" charset="2"/>
-              </a:rPr>
-              <a:t>Coefficients are provided  </a:t>
+              <a:t>Minas Gerais state</a:t>
             </a:r>
             <a:r>
-              <a:rPr lang="en-US" sz="1400" b="1" dirty="0">
+              <a:rPr lang="en-US" sz="900" dirty="0">
                 <a:solidFill>
                   <a:schemeClr val="tx1"/>
                 </a:solidFill>
-                <a:sym typeface="Wingdings" panose="05000000000000000000" pitchFamily="2" charset="2"/>
               </a:rPr>
-              <a:t>Easy to figure out which features are important</a:t>
+              <a:t>, mostly interested in </a:t>
             </a:r>
-            <a:endParaRPr lang="en-US" sz="1400" dirty="0">
-              <a:solidFill>
-                <a:schemeClr val="tx1"/>
-              </a:solidFill>
-            </a:endParaRPr>
-          </a:p>
-          <a:p>
-            <a:pPr>
-              <a:lnSpc>
-                <a:spcPct val="200000"/>
-              </a:lnSpc>
-            </a:pPr>
-            <a:endParaRPr lang="en-US" sz="1400" dirty="0">
-              <a:solidFill>
-                <a:schemeClr val="tx1"/>
-              </a:solidFill>
-            </a:endParaRPr>
-          </a:p>
-          <a:p>
-            <a:pPr>
-              <a:lnSpc>
-                <a:spcPct val="200000"/>
-              </a:lnSpc>
-            </a:pPr>
-            <a:endParaRPr lang="en-US" sz="1400" dirty="0">
-              <a:solidFill>
-                <a:schemeClr val="tx1"/>
-              </a:solidFill>
-            </a:endParaRPr>
+            <a:r>
+              <a:rPr lang="en-US" sz="900" b="1" dirty="0">
+                <a:solidFill>
+                  <a:schemeClr val="tx1"/>
+                </a:solidFill>
+              </a:rPr>
+              <a:t>sports, leisure, furniture, decor and auto products</a:t>
+            </a:r>
+            <a:r>
+              <a:rPr lang="en-US" sz="900" dirty="0">
+                <a:solidFill>
+                  <a:schemeClr val="tx1"/>
+                </a:solidFill>
+              </a:rPr>
+              <a:t>, gives high rated reviews.</a:t>
+            </a:r>
           </a:p>
         </p:txBody>
       </p:sp>
@@ -16793,8 +17541,8 @@
         </p:nvSpPr>
         <p:spPr>
           <a:xfrm>
-            <a:off x="344501" y="238848"/>
-            <a:ext cx="3864600" cy="909467"/>
+            <a:off x="269938" y="0"/>
+            <a:ext cx="3864600" cy="550060"/>
           </a:xfrm>
         </p:spPr>
         <p:txBody>
@@ -16807,7 +17555,7 @@
                   <a:schemeClr val="tx1"/>
                 </a:solidFill>
               </a:rPr>
-              <a:t>Model Interpretability</a:t>
+              <a:t>Segment characteristics</a:t>
             </a:r>
             <a:endParaRPr lang="en-US" b="1" dirty="0">
               <a:solidFill>
@@ -16819,10 +17567,10 @@
       </p:sp>
       <p:pic>
         <p:nvPicPr>
-          <p:cNvPr id="4098" name="Picture 2">
+          <p:cNvPr id="2050" name="Picture 2">
             <a:extLst>
               <a:ext uri="{FF2B5EF4-FFF2-40B4-BE49-F238E27FC236}">
-                <a16:creationId xmlns:a16="http://schemas.microsoft.com/office/drawing/2014/main" id="{C398601E-B6DC-93EC-974F-FF7662FC0EB8}"/>
+                <a16:creationId xmlns:a16="http://schemas.microsoft.com/office/drawing/2014/main" id="{BA9E9BBE-0BDC-520E-2EB8-44801A73D5D5}"/>
               </a:ext>
             </a:extLst>
           </p:cNvPr>
@@ -16846,8 +17594,96 @@
         </p:blipFill>
         <p:spPr bwMode="auto">
           <a:xfrm>
-            <a:off x="4572001" y="1095431"/>
-            <a:ext cx="4572000" cy="2931001"/>
+            <a:off x="5009461" y="0"/>
+            <a:ext cx="3598685" cy="1710000"/>
+          </a:xfrm>
+          <a:prstGeom prst="rect">
+            <a:avLst/>
+          </a:prstGeom>
+          <a:noFill/>
+          <a:ln>
+            <a:solidFill>
+              <a:schemeClr val="tx1"/>
+            </a:solidFill>
+          </a:ln>
+          <a:extLst>
+            <a:ext uri="{909E8E84-426E-40DD-AFC4-6F175D3DCCD1}">
+              <a14:hiddenFill xmlns:a14="http://schemas.microsoft.com/office/drawing/2010/main">
+                <a:solidFill>
+                  <a:srgbClr val="FFFFFF"/>
+                </a:solidFill>
+              </a14:hiddenFill>
+            </a:ext>
+          </a:extLst>
+        </p:spPr>
+      </p:pic>
+      <p:pic>
+        <p:nvPicPr>
+          <p:cNvPr id="2" name="Picture 2">
+            <a:extLst>
+              <a:ext uri="{FF2B5EF4-FFF2-40B4-BE49-F238E27FC236}">
+                <a16:creationId xmlns:a16="http://schemas.microsoft.com/office/drawing/2014/main" id="{CDA228D0-4681-4C5E-1E70-16FB856CEB1F}"/>
+              </a:ext>
+            </a:extLst>
+          </p:cNvPr>
+          <p:cNvPicPr>
+            <a:picLocks noChangeAspect="1" noChangeArrowheads="1"/>
+          </p:cNvPicPr>
+          <p:nvPr/>
+        </p:nvPicPr>
+        <p:blipFill>
+          <a:blip r:embed="rId4"/>
+          <a:srcRect/>
+          <a:stretch/>
+        </p:blipFill>
+        <p:spPr bwMode="auto">
+          <a:xfrm>
+            <a:off x="5009460" y="1723501"/>
+            <a:ext cx="3598685" cy="1710000"/>
+          </a:xfrm>
+          <a:prstGeom prst="rect">
+            <a:avLst/>
+          </a:prstGeom>
+          <a:noFill/>
+          <a:ln>
+            <a:solidFill>
+              <a:schemeClr val="tx1"/>
+            </a:solidFill>
+          </a:ln>
+          <a:extLst>
+            <a:ext uri="{909E8E84-426E-40DD-AFC4-6F175D3DCCD1}">
+              <a14:hiddenFill xmlns:a14="http://schemas.microsoft.com/office/drawing/2010/main">
+                <a:solidFill>
+                  <a:srgbClr val="FFFFFF"/>
+                </a:solidFill>
+              </a14:hiddenFill>
+            </a:ext>
+          </a:extLst>
+        </p:spPr>
+      </p:pic>
+      <p:pic>
+        <p:nvPicPr>
+          <p:cNvPr id="5" name="Picture 2">
+            <a:extLst>
+              <a:ext uri="{FF2B5EF4-FFF2-40B4-BE49-F238E27FC236}">
+                <a16:creationId xmlns:a16="http://schemas.microsoft.com/office/drawing/2014/main" id="{462BC5BF-F4D4-F3BC-2489-E20B8271B15C}"/>
+              </a:ext>
+            </a:extLst>
+          </p:cNvPr>
+          <p:cNvPicPr>
+            <a:picLocks noChangeAspect="1" noChangeArrowheads="1"/>
+          </p:cNvPicPr>
+          <p:nvPr/>
+        </p:nvPicPr>
+        <p:blipFill>
+          <a:blip r:embed="rId5"/>
+          <a:srcRect/>
+          <a:stretch/>
+        </p:blipFill>
+        <p:spPr bwMode="auto">
+          <a:xfrm>
+            <a:off x="5009460" y="3440141"/>
+            <a:ext cx="3598685" cy="1696718"/>
           </a:xfrm>
           <a:prstGeom prst="rect">
             <a:avLst/>
@@ -17243,7 +18079,7 @@
                 </a:solidFill>
                 <a:sym typeface="Wingdings" panose="05000000000000000000" pitchFamily="2" charset="2"/>
               </a:rPr>
-              <a:t>The dataset provided had </a:t>
+              <a:t>This project has outlined </a:t>
             </a:r>
             <a:r>
               <a:rPr lang="en-US" sz="1600" b="1" dirty="0">
@@ -17252,37 +18088,8 @@
                 </a:solidFill>
                 <a:sym typeface="Wingdings" panose="05000000000000000000" pitchFamily="2" charset="2"/>
               </a:rPr>
-              <a:t>a lot of missing values </a:t>
+              <a:t>6 stable customer segments  fulfill business need</a:t>
             </a:r>
-            <a:r>
-              <a:rPr lang="en-US" sz="1600" dirty="0">
-                <a:solidFill>
-                  <a:schemeClr val="tx1"/>
-                </a:solidFill>
-                <a:sym typeface="Wingdings" panose="05000000000000000000" pitchFamily="2" charset="2"/>
-              </a:rPr>
-              <a:t>and a </a:t>
-            </a:r>
-            <a:r>
-              <a:rPr lang="en-US" sz="1600" b="1" dirty="0">
-                <a:solidFill>
-                  <a:schemeClr val="tx1"/>
-                </a:solidFill>
-                <a:sym typeface="Wingdings" panose="05000000000000000000" pitchFamily="2" charset="2"/>
-              </a:rPr>
-              <a:t>significant amount of features</a:t>
-            </a:r>
-            <a:r>
-              <a:rPr lang="en-US" sz="1600" dirty="0">
-                <a:solidFill>
-                  <a:schemeClr val="tx1"/>
-                </a:solidFill>
-                <a:sym typeface="Wingdings" panose="05000000000000000000" pitchFamily="2" charset="2"/>
-              </a:rPr>
-              <a:t>.</a:t>
-            </a:r>
-          </a:p>
-          <a:p>
             <a:endParaRPr lang="en-US" sz="1600" dirty="0">
               <a:solidFill>
                 <a:schemeClr val="tx1"/>
@@ -17291,6 +18098,19 @@
             </a:endParaRPr>
           </a:p>
           <a:p>
+            <a:pPr>
+              <a:lnSpc>
+                <a:spcPct val="100000"/>
+              </a:lnSpc>
+            </a:pPr>
+            <a:endParaRPr lang="en-US" sz="1000" dirty="0">
+              <a:solidFill>
+                <a:schemeClr val="tx1"/>
+              </a:solidFill>
+              <a:sym typeface="Wingdings" panose="05000000000000000000" pitchFamily="2" charset="2"/>
+            </a:endParaRPr>
+          </a:p>
+          <a:p>
             <a:r>
               <a:rPr lang="en-US" sz="1600" dirty="0">
                 <a:solidFill>
@@ -17298,7 +18118,7 @@
                 </a:solidFill>
                 <a:sym typeface="Wingdings" panose="05000000000000000000" pitchFamily="2" charset="2"/>
               </a:rPr>
-              <a:t>We have built a model using </a:t>
+              <a:t>These segments can be used to </a:t>
             </a:r>
             <a:r>
               <a:rPr lang="en-US" sz="1600" b="1" dirty="0">
@@ -17307,7 +18127,7 @@
                 </a:solidFill>
                 <a:sym typeface="Wingdings" panose="05000000000000000000" pitchFamily="2" charset="2"/>
               </a:rPr>
-              <a:t>Ridge Regression </a:t>
+              <a:t>optimize marketing efforts </a:t>
             </a:r>
             <a:r>
               <a:rPr lang="en-US" sz="1600" dirty="0">
@@ -17316,8 +18136,156 @@
                 </a:solidFill>
                 <a:sym typeface="Wingdings" panose="05000000000000000000" pitchFamily="2" charset="2"/>
               </a:rPr>
-              <a:t>with this dataset.</a:t>
+              <a:t>in different ways</a:t>
             </a:r>
+            <a:r>
+              <a:rPr lang="en-US" sz="1600" b="1" dirty="0">
+                <a:solidFill>
+                  <a:schemeClr val="tx1"/>
+                </a:solidFill>
+                <a:sym typeface="Wingdings" panose="05000000000000000000" pitchFamily="2" charset="2"/>
+              </a:rPr>
+              <a:t>:</a:t>
+            </a:r>
+          </a:p>
+          <a:p>
+            <a:pPr marL="171450" indent="0">
+              <a:buNone/>
+            </a:pPr>
+            <a:endParaRPr lang="en-US" sz="800" b="1" dirty="0">
+              <a:solidFill>
+                <a:schemeClr val="tx1"/>
+              </a:solidFill>
+              <a:sym typeface="Wingdings" panose="05000000000000000000" pitchFamily="2" charset="2"/>
+            </a:endParaRPr>
+          </a:p>
+          <a:p>
+            <a:pPr lvl="2">
+              <a:buFont typeface="Wingdings" panose="05000000000000000000" pitchFamily="2" charset="2"/>
+              <a:buChar char="Ø"/>
+            </a:pPr>
+            <a:r>
+              <a:rPr lang="en-US" sz="1600" b="1" dirty="0">
+                <a:solidFill>
+                  <a:schemeClr val="tx1"/>
+                </a:solidFill>
+                <a:sym typeface="Wingdings" panose="05000000000000000000" pitchFamily="2" charset="2"/>
+              </a:rPr>
+              <a:t>Reduce costs and improve marketing ROI by targeting ideal customers.</a:t>
+            </a:r>
+          </a:p>
+          <a:p>
+            <a:pPr marL="1073150" lvl="2" indent="0">
+              <a:buNone/>
+            </a:pPr>
+            <a:endParaRPr lang="en-US" sz="800" b="1" dirty="0">
+              <a:solidFill>
+                <a:schemeClr val="tx1"/>
+              </a:solidFill>
+              <a:sym typeface="Wingdings" panose="05000000000000000000" pitchFamily="2" charset="2"/>
+            </a:endParaRPr>
+          </a:p>
+          <a:p>
+            <a:pPr lvl="2">
+              <a:buFont typeface="Wingdings" panose="05000000000000000000" pitchFamily="2" charset="2"/>
+              <a:buChar char="Ø"/>
+            </a:pPr>
+            <a:r>
+              <a:rPr lang="en-US" sz="1600" dirty="0">
+                <a:solidFill>
+                  <a:schemeClr val="tx1"/>
+                </a:solidFill>
+                <a:sym typeface="Wingdings" panose="05000000000000000000" pitchFamily="2" charset="2"/>
+              </a:rPr>
+              <a:t>For local ad campaigns</a:t>
+            </a:r>
+            <a:r>
+              <a:rPr lang="en-US" sz="1600" b="1" dirty="0">
+                <a:solidFill>
+                  <a:schemeClr val="tx1"/>
+                </a:solidFill>
+                <a:sym typeface="Wingdings" panose="05000000000000000000" pitchFamily="2" charset="2"/>
+              </a:rPr>
+              <a:t>, focus on the products interesting the customers.</a:t>
+            </a:r>
+          </a:p>
+          <a:p>
+            <a:pPr lvl="2">
+              <a:buFont typeface="Wingdings" panose="05000000000000000000" pitchFamily="2" charset="2"/>
+              <a:buChar char="Ø"/>
+            </a:pPr>
+            <a:endParaRPr lang="en-US" sz="800" b="1" dirty="0">
+              <a:solidFill>
+                <a:schemeClr val="tx1"/>
+              </a:solidFill>
+              <a:sym typeface="Wingdings" panose="05000000000000000000" pitchFamily="2" charset="2"/>
+            </a:endParaRPr>
+          </a:p>
+          <a:p>
+            <a:pPr lvl="2">
+              <a:buFont typeface="Wingdings" panose="05000000000000000000" pitchFamily="2" charset="2"/>
+              <a:buChar char="Ø"/>
+            </a:pPr>
+            <a:r>
+              <a:rPr lang="en-US" sz="1600" b="1" dirty="0">
+                <a:solidFill>
+                  <a:schemeClr val="tx1"/>
+                </a:solidFill>
+                <a:sym typeface="Wingdings" panose="05000000000000000000" pitchFamily="2" charset="2"/>
+              </a:rPr>
+              <a:t>Write custom advertisements depending on customer needs </a:t>
+            </a:r>
+            <a:r>
+              <a:rPr lang="en-US" sz="1600" dirty="0">
+                <a:solidFill>
+                  <a:schemeClr val="tx1"/>
+                </a:solidFill>
+                <a:sym typeface="Wingdings" panose="05000000000000000000" pitchFamily="2" charset="2"/>
+              </a:rPr>
+              <a:t>(i.e. short shipping delay or possibility to buy without credit card).</a:t>
+            </a:r>
+          </a:p>
+          <a:p>
+            <a:pPr lvl="2">
+              <a:buFont typeface="Wingdings" panose="05000000000000000000" pitchFamily="2" charset="2"/>
+              <a:buChar char="Ø"/>
+            </a:pPr>
+            <a:endParaRPr lang="en-US" sz="800" dirty="0">
+              <a:solidFill>
+                <a:schemeClr val="tx1"/>
+              </a:solidFill>
+              <a:sym typeface="Wingdings" panose="05000000000000000000" pitchFamily="2" charset="2"/>
+            </a:endParaRPr>
+          </a:p>
+          <a:p>
+            <a:pPr lvl="2">
+              <a:buFont typeface="Wingdings" panose="05000000000000000000" pitchFamily="2" charset="2"/>
+              <a:buChar char="Ø"/>
+            </a:pPr>
+            <a:r>
+              <a:rPr lang="en-US" sz="1600" dirty="0">
+                <a:solidFill>
+                  <a:schemeClr val="tx1"/>
+                </a:solidFill>
+                <a:sym typeface="Wingdings" panose="05000000000000000000" pitchFamily="2" charset="2"/>
+              </a:rPr>
+              <a:t>More generally, </a:t>
+            </a:r>
+            <a:r>
+              <a:rPr lang="en-US" sz="1600" b="1" dirty="0">
+                <a:solidFill>
+                  <a:schemeClr val="tx1"/>
+                </a:solidFill>
+                <a:sym typeface="Wingdings" panose="05000000000000000000" pitchFamily="2" charset="2"/>
+              </a:rPr>
+              <a:t>target high paying customers with low cancellation rates.</a:t>
+            </a:r>
+            <a:endParaRPr lang="en-US" sz="1600" dirty="0">
+              <a:solidFill>
+                <a:schemeClr val="tx1"/>
+              </a:solidFill>
+              <a:sym typeface="Wingdings" panose="05000000000000000000" pitchFamily="2" charset="2"/>
+            </a:endParaRPr>
           </a:p>
           <a:p>
             <a:pPr marL="171450" indent="0">
@@ -17332,41 +18300,13 @@
           </a:p>
           <a:p>
             <a:r>
-              <a:rPr lang="en-US" sz="1600" b="1" dirty="0">
+              <a:rPr lang="en-US" sz="1600" dirty="0">
                 <a:solidFill>
                   <a:schemeClr val="tx1"/>
                 </a:solidFill>
                 <a:sym typeface="Wingdings" panose="05000000000000000000" pitchFamily="2" charset="2"/>
               </a:rPr>
-              <a:t>It is an interpretable model</a:t>
-            </a:r>
-            <a:r>
-              <a:rPr lang="en-US" sz="1600" dirty="0">
-                <a:solidFill>
-                  <a:schemeClr val="tx1"/>
-                </a:solidFill>
-                <a:sym typeface="Wingdings" panose="05000000000000000000" pitchFamily="2" charset="2"/>
-              </a:rPr>
-              <a:t> that can be used by non-technical employees.</a:t>
-            </a:r>
-          </a:p>
-          <a:p>
-            <a:endParaRPr lang="en-US" sz="1600" b="1" dirty="0">
-              <a:solidFill>
-                <a:schemeClr val="tx1"/>
-              </a:solidFill>
-              <a:sym typeface="Wingdings" panose="05000000000000000000" pitchFamily="2" charset="2"/>
-            </a:endParaRPr>
-          </a:p>
-          <a:p>
-            <a:r>
-              <a:rPr lang="en-US" sz="1600" dirty="0">
-                <a:solidFill>
-                  <a:schemeClr val="tx1"/>
-                </a:solidFill>
-                <a:sym typeface="Wingdings" panose="05000000000000000000" pitchFamily="2" charset="2"/>
-              </a:rPr>
-              <a:t>The model is able to detect </a:t>
+              <a:t>The model could be improved by </a:t>
             </a:r>
             <a:r>
               <a:rPr lang="en-US" sz="1600" b="1" dirty="0">
@@ -17375,123 +18315,8 @@
                 </a:solidFill>
                 <a:sym typeface="Wingdings" panose="05000000000000000000" pitchFamily="2" charset="2"/>
               </a:rPr>
-              <a:t>70% of potential bad borrowers at the cost of 30% of misdetection of good customers.</a:t>
+              <a:t>providing additional information like customer age and gender</a:t>
             </a:r>
-          </a:p>
-          <a:p>
-            <a:endParaRPr lang="en-US" sz="1600" b="1" dirty="0">
-              <a:solidFill>
-                <a:schemeClr val="tx1"/>
-              </a:solidFill>
-              <a:sym typeface="Wingdings" panose="05000000000000000000" pitchFamily="2" charset="2"/>
-            </a:endParaRPr>
-          </a:p>
-          <a:p>
-            <a:r>
-              <a:rPr lang="en-US" sz="1600" dirty="0">
-                <a:solidFill>
-                  <a:schemeClr val="tx1"/>
-                </a:solidFill>
-                <a:sym typeface="Wingdings" panose="05000000000000000000" pitchFamily="2" charset="2"/>
-              </a:rPr>
-              <a:t>The </a:t>
-            </a:r>
-            <a:r>
-              <a:rPr lang="en-US" sz="1600" b="1" dirty="0">
-                <a:solidFill>
-                  <a:schemeClr val="tx1"/>
-                </a:solidFill>
-                <a:sym typeface="Wingdings" panose="05000000000000000000" pitchFamily="2" charset="2"/>
-              </a:rPr>
-              <a:t>coefficients of each feature </a:t>
-            </a:r>
-            <a:r>
-              <a:rPr lang="en-US" sz="1600" dirty="0">
-                <a:solidFill>
-                  <a:schemeClr val="tx1"/>
-                </a:solidFill>
-                <a:sym typeface="Wingdings" panose="05000000000000000000" pitchFamily="2" charset="2"/>
-              </a:rPr>
-              <a:t>can be easily interpreted, the </a:t>
-            </a:r>
-            <a:r>
-              <a:rPr lang="en-US" sz="1600" b="1" dirty="0">
-                <a:solidFill>
-                  <a:schemeClr val="tx1"/>
-                </a:solidFill>
-                <a:sym typeface="Wingdings" panose="05000000000000000000" pitchFamily="2" charset="2"/>
-              </a:rPr>
-              <a:t>most useful dataset is the credit card balance data</a:t>
-            </a:r>
-            <a:r>
-              <a:rPr lang="en-US" sz="1600" dirty="0">
-                <a:solidFill>
-                  <a:schemeClr val="tx1"/>
-                </a:solidFill>
-                <a:sym typeface="Wingdings" panose="05000000000000000000" pitchFamily="2" charset="2"/>
-              </a:rPr>
-              <a:t>.</a:t>
-            </a:r>
-            <a:endParaRPr lang="en-US" sz="1600" b="1" dirty="0">
-              <a:solidFill>
-                <a:schemeClr val="tx1"/>
-              </a:solidFill>
-              <a:sym typeface="Wingdings" panose="05000000000000000000" pitchFamily="2" charset="2"/>
-            </a:endParaRPr>
-          </a:p>
-          <a:p>
-            <a:endParaRPr lang="en-US" sz="1600" dirty="0">
-              <a:solidFill>
-                <a:schemeClr val="tx1"/>
-              </a:solidFill>
-              <a:sym typeface="Wingdings" panose="05000000000000000000" pitchFamily="2" charset="2"/>
-            </a:endParaRPr>
-          </a:p>
-          <a:p>
-            <a:r>
-              <a:rPr lang="en-US" sz="1600" dirty="0">
-                <a:solidFill>
-                  <a:schemeClr val="tx1"/>
-                </a:solidFill>
-                <a:sym typeface="Wingdings" panose="05000000000000000000" pitchFamily="2" charset="2"/>
-              </a:rPr>
-              <a:t>This model could be improved by </a:t>
-            </a:r>
-            <a:r>
-              <a:rPr lang="en-US" sz="1600" b="1" dirty="0">
-                <a:solidFill>
-                  <a:schemeClr val="tx1"/>
-                </a:solidFill>
-                <a:sym typeface="Wingdings" panose="05000000000000000000" pitchFamily="2" charset="2"/>
-              </a:rPr>
-              <a:t>using a better performing but less interpretable algorithm</a:t>
-            </a:r>
-            <a:r>
-              <a:rPr lang="en-US" sz="1600" dirty="0">
-                <a:solidFill>
-                  <a:schemeClr val="tx1"/>
-                </a:solidFill>
-                <a:sym typeface="Wingdings" panose="05000000000000000000" pitchFamily="2" charset="2"/>
-              </a:rPr>
-              <a:t>.</a:t>
-            </a:r>
-            <a:r>
-              <a:rPr lang="en-US" sz="1600" b="1" dirty="0">
-                <a:solidFill>
-                  <a:schemeClr val="tx1"/>
-                </a:solidFill>
-                <a:sym typeface="Wingdings" panose="05000000000000000000" pitchFamily="2" charset="2"/>
-              </a:rPr>
-              <a:t> </a:t>
-            </a:r>
-            <a:endParaRPr lang="en-US" sz="1600" dirty="0">
-              <a:solidFill>
-                <a:schemeClr val="tx1"/>
-              </a:solidFill>
-              <a:sym typeface="Wingdings" panose="05000000000000000000" pitchFamily="2" charset="2"/>
-            </a:endParaRPr>
-          </a:p>
-          <a:p>
             <a:endParaRPr lang="en-US" sz="1600" dirty="0">
               <a:solidFill>
                 <a:schemeClr val="tx1"/>
@@ -17537,7 +18362,7 @@
           <a:p>
             <a:r>
               <a:rPr lang="en-US" b="1" dirty="0"/>
-              <a:t>Conclusion</a:t>
+              <a:t>Recommendations</a:t>
             </a:r>
           </a:p>
         </p:txBody>

</xml_diff>